<commit_message>
refined practical scenarios for P1 to P3
</commit_message>
<xml_diff>
--- a/T7.3/TraceabilityArchitecture/images/2015-11-01 openETCS traceability_Figures.pptx
+++ b/T7.3/TraceabilityArchitecture/images/2015-11-01 openETCS traceability_Figures.pptx
@@ -5,10 +5,10 @@
     <p:sldMasterId id="2147483648" r:id="rId1"/>
   </p:sldMasterIdLst>
   <p:notesMasterIdLst>
-    <p:notesMasterId r:id="rId33"/>
+    <p:notesMasterId r:id="rId35"/>
   </p:notesMasterIdLst>
   <p:handoutMasterIdLst>
-    <p:handoutMasterId r:id="rId34"/>
+    <p:handoutMasterId r:id="rId36"/>
   </p:handoutMasterIdLst>
   <p:sldIdLst>
     <p:sldId id="256" r:id="rId2"/>
@@ -42,6 +42,8 @@
     <p:sldId id="308" r:id="rId30"/>
     <p:sldId id="313" r:id="rId31"/>
     <p:sldId id="315" r:id="rId32"/>
+    <p:sldId id="316" r:id="rId33"/>
+    <p:sldId id="317" r:id="rId34"/>
   </p:sldIdLst>
   <p:sldSz cx="9144000" cy="6858000" type="screen4x3"/>
   <p:notesSz cx="6858000" cy="9144000"/>
@@ -4029,7 +4031,7 @@
         </p:nvSpPr>
         <p:spPr>
           <a:xfrm>
-            <a:off x="3326812" y="-53360"/>
+            <a:off x="3020427" y="63302"/>
             <a:ext cx="3805399" cy="369332"/>
           </a:xfrm>
           <a:prstGeom prst="rect">
@@ -4083,7 +4085,7 @@
         </p:nvGrpSpPr>
         <p:grpSpPr>
           <a:xfrm>
-            <a:off x="334947" y="522921"/>
+            <a:off x="334947" y="1091659"/>
             <a:ext cx="8459518" cy="5541715"/>
             <a:chOff x="334947" y="522921"/>
             <a:chExt cx="8459518" cy="5541715"/>
@@ -4219,12 +4221,12 @@
           </p:nvSpPr>
           <p:spPr>
             <a:xfrm>
-              <a:off x="334947" y="1036492"/>
-              <a:ext cx="2096962" cy="4485467"/>
+              <a:off x="334947" y="1360713"/>
+              <a:ext cx="2096962" cy="4161245"/>
             </a:xfrm>
             <a:prstGeom prst="can">
               <a:avLst>
-                <a:gd name="adj" fmla="val 16329"/>
+                <a:gd name="adj" fmla="val 6812"/>
               </a:avLst>
             </a:prstGeom>
             <a:solidFill>
@@ -4506,19 +4508,25 @@
               <a:pPr algn="ctr"/>
               <a:r>
                 <a:rPr lang="eu-ES" sz="1400" dirty="0" smtClean="0"/>
-                <a:t>OpenETCS (formal) executable SCADE</a:t>
+                <a:t>OpenETCS (formal</a:t>
               </a:r>
-            </a:p>
-            <a:p>
-              <a:pPr algn="ctr"/>
               <a:r>
-                <a:rPr lang="fr-FR" sz="1400" dirty="0" smtClean="0"/>
+                <a:rPr lang="eu-ES" sz="1400" smtClean="0"/>
+                <a:t>) </a:t>
+              </a:r>
+              <a:r>
+                <a:rPr lang="eu-ES" sz="1400" smtClean="0"/>
+                <a:t>overall executable SCADE </a:t>
+              </a:r>
+              <a:r>
+                <a:rPr lang="fr-FR" sz="1400" smtClean="0"/>
                 <a:t>M</a:t>
               </a:r>
               <a:r>
                 <a:rPr lang="eu-ES" sz="1400" dirty="0" smtClean="0"/>
                 <a:t>odel</a:t>
               </a:r>
+              <a:endParaRPr lang="eu-ES" sz="1400" dirty="0" smtClean="0"/>
             </a:p>
             <a:p>
               <a:pPr algn="ctr"/>
@@ -4695,8 +4703,8 @@
           </p:nvSpPr>
           <p:spPr>
             <a:xfrm>
-              <a:off x="436079" y="2040557"/>
-              <a:ext cx="1705556" cy="754178"/>
+              <a:off x="436079" y="2110619"/>
+              <a:ext cx="1705556" cy="684116"/>
             </a:xfrm>
             <a:prstGeom prst="rect">
               <a:avLst/>
@@ -5376,6 +5384,174 @@
           </p:style>
         </p:cxnSp>
       </p:grpSp>
+      <p:sp>
+        <p:nvSpPr>
+          <p:cNvPr id="29" name="Cylindre 28"/>
+          <p:cNvSpPr/>
+          <p:nvPr/>
+        </p:nvSpPr>
+        <p:spPr>
+          <a:xfrm>
+            <a:off x="334947" y="780009"/>
+            <a:ext cx="2096962" cy="968015"/>
+          </a:xfrm>
+          <a:prstGeom prst="can">
+            <a:avLst>
+              <a:gd name="adj" fmla="val 11757"/>
+            </a:avLst>
+          </a:prstGeom>
+          <a:gradFill flip="none" rotWithShape="1">
+            <a:gsLst>
+              <a:gs pos="0">
+                <a:srgbClr val="8000FF"/>
+              </a:gs>
+              <a:gs pos="100000">
+                <a:srgbClr val="FF00FF"/>
+              </a:gs>
+            </a:gsLst>
+            <a:lin ang="5400000" scaled="0"/>
+            <a:tileRect/>
+          </a:gradFill>
+          <a:ln>
+            <a:solidFill>
+              <a:srgbClr val="000000"/>
+            </a:solidFill>
+          </a:ln>
+        </p:spPr>
+        <p:style>
+          <a:lnRef idx="1">
+            <a:schemeClr val="accent1"/>
+          </a:lnRef>
+          <a:fillRef idx="3">
+            <a:schemeClr val="accent1"/>
+          </a:fillRef>
+          <a:effectRef idx="2">
+            <a:schemeClr val="accent1"/>
+          </a:effectRef>
+          <a:fontRef idx="minor">
+            <a:schemeClr val="lt1"/>
+          </a:fontRef>
+        </p:style>
+        <p:txBody>
+          <a:bodyPr rtlCol="0" anchor="ctr"/>
+          <a:lstStyle/>
+          <a:p>
+            <a:pPr algn="ctr"/>
+            <a:r>
+              <a:rPr lang="fr-FR" sz="1600" dirty="0" smtClean="0">
+                <a:solidFill>
+                  <a:schemeClr val="bg1"/>
+                </a:solidFill>
+              </a:rPr>
+              <a:t>SRS </a:t>
+            </a:r>
+            <a:r>
+              <a:rPr lang="fr-FR" sz="1600" dirty="0" err="1" smtClean="0">
+                <a:solidFill>
+                  <a:schemeClr val="bg1"/>
+                </a:solidFill>
+              </a:rPr>
+              <a:t>Subset</a:t>
+            </a:r>
+            <a:r>
+              <a:rPr lang="fr-FR" sz="1600" dirty="0" smtClean="0">
+                <a:solidFill>
+                  <a:schemeClr val="bg1"/>
+                </a:solidFill>
+              </a:rPr>
+              <a:t> 26 requirements</a:t>
+            </a:r>
+          </a:p>
+          <a:p>
+            <a:pPr algn="ctr"/>
+            <a:r>
+              <a:rPr lang="fr-FR" sz="1600" dirty="0" smtClean="0">
+                <a:solidFill>
+                  <a:schemeClr val="bg1"/>
+                </a:solidFill>
+              </a:rPr>
+              <a:t>as .ReqIF files</a:t>
+            </a:r>
+            <a:endParaRPr lang="fr-FR" sz="1600" dirty="0">
+              <a:solidFill>
+                <a:schemeClr val="bg1"/>
+              </a:solidFill>
+            </a:endParaRPr>
+          </a:p>
+        </p:txBody>
+      </p:sp>
+      <p:cxnSp>
+        <p:nvCxnSpPr>
+          <p:cNvPr id="30" name="Connecteur droit avec flèche 29"/>
+          <p:cNvCxnSpPr/>
+          <p:nvPr/>
+        </p:nvCxnSpPr>
+        <p:spPr>
+          <a:xfrm>
+            <a:off x="2431909" y="1536357"/>
+            <a:ext cx="980286" cy="489857"/>
+          </a:xfrm>
+          <a:prstGeom prst="straightConnector1">
+            <a:avLst/>
+          </a:prstGeom>
+          <a:ln w="28575" cmpd="sng">
+            <a:solidFill>
+              <a:srgbClr val="000000"/>
+            </a:solidFill>
+            <a:tailEnd type="arrow"/>
+          </a:ln>
+        </p:spPr>
+        <p:style>
+          <a:lnRef idx="2">
+            <a:schemeClr val="accent1"/>
+          </a:lnRef>
+          <a:fillRef idx="0">
+            <a:schemeClr val="accent1"/>
+          </a:fillRef>
+          <a:effectRef idx="1">
+            <a:schemeClr val="accent1"/>
+          </a:effectRef>
+          <a:fontRef idx="minor">
+            <a:schemeClr val="tx1"/>
+          </a:fontRef>
+        </p:style>
+      </p:cxnSp>
+      <p:cxnSp>
+        <p:nvCxnSpPr>
+          <p:cNvPr id="33" name="Connecteur droit avec flèche 32"/>
+          <p:cNvCxnSpPr/>
+          <p:nvPr/>
+        </p:nvCxnSpPr>
+        <p:spPr>
+          <a:xfrm>
+            <a:off x="1438875" y="1740394"/>
+            <a:ext cx="0" cy="272138"/>
+          </a:xfrm>
+          <a:prstGeom prst="straightConnector1">
+            <a:avLst/>
+          </a:prstGeom>
+          <a:ln w="28575" cmpd="sng">
+            <a:solidFill>
+              <a:srgbClr val="000000"/>
+            </a:solidFill>
+            <a:tailEnd type="arrow"/>
+          </a:ln>
+        </p:spPr>
+        <p:style>
+          <a:lnRef idx="2">
+            <a:schemeClr val="accent1"/>
+          </a:lnRef>
+          <a:fillRef idx="0">
+            <a:schemeClr val="accent1"/>
+          </a:fillRef>
+          <a:effectRef idx="1">
+            <a:schemeClr val="accent1"/>
+          </a:effectRef>
+          <a:fontRef idx="minor">
+            <a:schemeClr val="tx1"/>
+          </a:fontRef>
+        </p:style>
+      </p:cxnSp>
     </p:spTree>
     <p:extLst>
       <p:ext uri="{BB962C8B-B14F-4D97-AF65-F5344CB8AC3E}">
@@ -7040,84 +7216,6 @@
               <a:srgbClr val="000000"/>
             </a:solidFill>
             <a:tailEnd type="arrow"/>
-          </a:ln>
-        </p:spPr>
-        <p:style>
-          <a:lnRef idx="2">
-            <a:schemeClr val="accent1"/>
-          </a:lnRef>
-          <a:fillRef idx="0">
-            <a:schemeClr val="accent1"/>
-          </a:fillRef>
-          <a:effectRef idx="1">
-            <a:schemeClr val="accent1"/>
-          </a:effectRef>
-          <a:fontRef idx="minor">
-            <a:schemeClr val="tx1"/>
-          </a:fontRef>
-        </p:style>
-      </p:cxnSp>
-      <p:cxnSp>
-        <p:nvCxnSpPr>
-          <p:cNvPr id="95" name="Connecteur droit avec flèche 94"/>
-          <p:cNvCxnSpPr>
-            <a:stCxn id="84" idx="1"/>
-          </p:cNvCxnSpPr>
-          <p:nvPr/>
-        </p:nvCxnSpPr>
-        <p:spPr>
-          <a:xfrm flipH="1">
-            <a:off x="2181350" y="4168667"/>
-            <a:ext cx="562807" cy="389693"/>
-          </a:xfrm>
-          <a:prstGeom prst="straightConnector1">
-            <a:avLst/>
-          </a:prstGeom>
-          <a:ln>
-            <a:solidFill>
-              <a:srgbClr val="FF6600"/>
-            </a:solidFill>
-            <a:prstDash val="sysDash"/>
-            <a:headEnd type="oval"/>
-            <a:tailEnd type="stealth" w="lg" len="lg"/>
-          </a:ln>
-        </p:spPr>
-        <p:style>
-          <a:lnRef idx="2">
-            <a:schemeClr val="accent1"/>
-          </a:lnRef>
-          <a:fillRef idx="0">
-            <a:schemeClr val="accent1"/>
-          </a:fillRef>
-          <a:effectRef idx="1">
-            <a:schemeClr val="accent1"/>
-          </a:effectRef>
-          <a:fontRef idx="minor">
-            <a:schemeClr val="tx1"/>
-          </a:fontRef>
-        </p:style>
-      </p:cxnSp>
-      <p:cxnSp>
-        <p:nvCxnSpPr>
-          <p:cNvPr id="96" name="Connecteur droit avec flèche 95"/>
-          <p:cNvCxnSpPr/>
-          <p:nvPr/>
-        </p:nvCxnSpPr>
-        <p:spPr>
-          <a:xfrm flipH="1">
-            <a:off x="2181351" y="4491503"/>
-            <a:ext cx="839077" cy="858436"/>
-          </a:xfrm>
-          <a:prstGeom prst="straightConnector1">
-            <a:avLst/>
-          </a:prstGeom>
-          <a:ln>
-            <a:solidFill>
-              <a:srgbClr val="FF6600"/>
-            </a:solidFill>
-            <a:prstDash val="sysDash"/>
-            <a:headEnd type="oval"/>
-            <a:tailEnd type="stealth" w="lg" len="lg"/>
           </a:ln>
         </p:spPr>
         <p:style>
@@ -44091,6 +44189,2336 @@
 </p:sld>
 </file>
 
+<file path=ppt/slides/slide32.xml><?xml version="1.0" encoding="utf-8"?>
+<p:sld xmlns:a="http://schemas.openxmlformats.org/drawingml/2006/main" xmlns:r="http://schemas.openxmlformats.org/officeDocument/2006/relationships" xmlns:p="http://schemas.openxmlformats.org/presentationml/2006/main">
+  <p:cSld>
+    <p:spTree>
+      <p:nvGrpSpPr>
+        <p:cNvPr id="1" name=""/>
+        <p:cNvGrpSpPr/>
+        <p:nvPr/>
+      </p:nvGrpSpPr>
+      <p:grpSpPr>
+        <a:xfrm>
+          <a:off x="0" y="0"/>
+          <a:ext cx="0" cy="0"/>
+          <a:chOff x="0" y="0"/>
+          <a:chExt cx="0" cy="0"/>
+        </a:xfrm>
+      </p:grpSpPr>
+      <p:sp>
+        <p:nvSpPr>
+          <p:cNvPr id="150" name="ZoneTexte 149"/>
+          <p:cNvSpPr txBox="1"/>
+          <p:nvPr/>
+        </p:nvSpPr>
+        <p:spPr>
+          <a:xfrm>
+            <a:off x="3116486" y="38504"/>
+            <a:ext cx="3641968" cy="369332"/>
+          </a:xfrm>
+          <a:prstGeom prst="rect">
+            <a:avLst/>
+          </a:prstGeom>
+          <a:noFill/>
+        </p:spPr>
+        <p:txBody>
+          <a:bodyPr wrap="none" rtlCol="0">
+            <a:spAutoFit/>
+          </a:bodyPr>
+          <a:lstStyle/>
+          <a:p>
+            <a:r>
+              <a:rPr lang="fr-FR" dirty="0" err="1" smtClean="0"/>
+              <a:t>requirement</a:t>
+            </a:r>
+            <a:r>
+              <a:rPr lang="fr-FR" dirty="0" smtClean="0"/>
+              <a:t> </a:t>
+            </a:r>
+            <a:r>
+              <a:rPr lang="fr-FR" dirty="0" err="1" smtClean="0"/>
+              <a:t>creation</a:t>
+            </a:r>
+            <a:r>
+              <a:rPr lang="fr-FR" dirty="0" smtClean="0"/>
+              <a:t> </a:t>
+            </a:r>
+            <a:r>
+              <a:rPr lang="fr-FR" dirty="0" err="1" smtClean="0"/>
+              <a:t>at</a:t>
+            </a:r>
+            <a:r>
+              <a:rPr lang="fr-FR" dirty="0" smtClean="0"/>
+              <a:t> system </a:t>
+            </a:r>
+            <a:r>
+              <a:rPr lang="fr-FR" dirty="0" err="1" smtClean="0"/>
+              <a:t>level</a:t>
+            </a:r>
+            <a:endParaRPr lang="fr-FR" dirty="0"/>
+          </a:p>
+        </p:txBody>
+      </p:sp>
+      <p:sp>
+        <p:nvSpPr>
+          <p:cNvPr id="23" name="ZoneTexte 22"/>
+          <p:cNvSpPr txBox="1"/>
+          <p:nvPr/>
+        </p:nvSpPr>
+        <p:spPr>
+          <a:xfrm>
+            <a:off x="5776842" y="6309043"/>
+            <a:ext cx="2384613" cy="307777"/>
+          </a:xfrm>
+          <a:prstGeom prst="rect">
+            <a:avLst/>
+          </a:prstGeom>
+          <a:noFill/>
+        </p:spPr>
+        <p:txBody>
+          <a:bodyPr wrap="square" rtlCol="0">
+            <a:spAutoFit/>
+          </a:bodyPr>
+          <a:lstStyle/>
+          <a:p>
+            <a:pPr algn="ctr"/>
+            <a:r>
+              <a:rPr lang="eu-ES" sz="1400" dirty="0" smtClean="0"/>
+              <a:t>Requirement analysis</a:t>
+            </a:r>
+            <a:endParaRPr lang="eu-ES" sz="1400" dirty="0"/>
+          </a:p>
+        </p:txBody>
+      </p:sp>
+      <p:grpSp>
+        <p:nvGrpSpPr>
+          <p:cNvPr id="5" name="Grouper 4"/>
+          <p:cNvGrpSpPr/>
+          <p:nvPr/>
+        </p:nvGrpSpPr>
+        <p:grpSpPr>
+          <a:xfrm>
+            <a:off x="347340" y="584603"/>
+            <a:ext cx="7582620" cy="6085332"/>
+            <a:chOff x="347340" y="584603"/>
+            <a:chExt cx="7582620" cy="6085332"/>
+          </a:xfrm>
+        </p:grpSpPr>
+        <p:sp>
+          <p:nvSpPr>
+            <p:cNvPr id="68" name="Rectangle 67"/>
+            <p:cNvSpPr/>
+            <p:nvPr/>
+          </p:nvSpPr>
+          <p:spPr>
+            <a:xfrm>
+              <a:off x="347340" y="584603"/>
+              <a:ext cx="7582620" cy="6085332"/>
+            </a:xfrm>
+            <a:prstGeom prst="rect">
+              <a:avLst/>
+            </a:prstGeom>
+            <a:solidFill>
+              <a:schemeClr val="bg1">
+                <a:lumMod val="85000"/>
+                <a:alpha val="18000"/>
+              </a:schemeClr>
+            </a:solidFill>
+            <a:ln>
+              <a:solidFill>
+                <a:schemeClr val="tx1"/>
+              </a:solidFill>
+            </a:ln>
+          </p:spPr>
+          <p:style>
+            <a:lnRef idx="1">
+              <a:schemeClr val="accent1"/>
+            </a:lnRef>
+            <a:fillRef idx="3">
+              <a:schemeClr val="accent1"/>
+            </a:fillRef>
+            <a:effectRef idx="2">
+              <a:schemeClr val="accent1"/>
+            </a:effectRef>
+            <a:fontRef idx="minor">
+              <a:schemeClr val="lt1"/>
+            </a:fontRef>
+          </p:style>
+          <p:txBody>
+            <a:bodyPr rtlCol="0" anchor="ctr"/>
+            <a:lstStyle/>
+            <a:p>
+              <a:pPr algn="ctr"/>
+              <a:endParaRPr lang="fr-FR"/>
+            </a:p>
+          </p:txBody>
+        </p:sp>
+        <p:sp>
+          <p:nvSpPr>
+            <p:cNvPr id="11" name="Rectangle à coins arrondis 10"/>
+            <p:cNvSpPr/>
+            <p:nvPr/>
+          </p:nvSpPr>
+          <p:spPr>
+            <a:xfrm>
+              <a:off x="3116486" y="1173904"/>
+              <a:ext cx="3842239" cy="3831195"/>
+            </a:xfrm>
+            <a:prstGeom prst="roundRect">
+              <a:avLst/>
+            </a:prstGeom>
+            <a:solidFill>
+              <a:srgbClr val="3366FF"/>
+            </a:solidFill>
+          </p:spPr>
+          <p:style>
+            <a:lnRef idx="1">
+              <a:schemeClr val="accent1"/>
+            </a:lnRef>
+            <a:fillRef idx="3">
+              <a:schemeClr val="accent1"/>
+            </a:fillRef>
+            <a:effectRef idx="2">
+              <a:schemeClr val="accent1"/>
+            </a:effectRef>
+            <a:fontRef idx="minor">
+              <a:schemeClr val="lt1"/>
+            </a:fontRef>
+          </p:style>
+          <p:txBody>
+            <a:bodyPr rtlCol="0" anchor="ctr"/>
+            <a:lstStyle/>
+            <a:p>
+              <a:pPr algn="ctr"/>
+              <a:r>
+                <a:rPr lang="eu-ES" sz="1600" dirty="0" smtClean="0"/>
+                <a:t>OpenETCS architecture SysML model - system level definition</a:t>
+              </a:r>
+            </a:p>
+            <a:p>
+              <a:pPr algn="ctr"/>
+              <a:endParaRPr lang="eu-ES" sz="1600" dirty="0"/>
+            </a:p>
+            <a:p>
+              <a:pPr algn="ctr"/>
+              <a:endParaRPr lang="eu-ES" sz="1600" dirty="0" smtClean="0"/>
+            </a:p>
+            <a:p>
+              <a:pPr algn="ctr"/>
+              <a:endParaRPr lang="eu-ES" sz="1600" dirty="0"/>
+            </a:p>
+            <a:p>
+              <a:pPr algn="ctr"/>
+              <a:endParaRPr lang="eu-ES" sz="1600" dirty="0" smtClean="0"/>
+            </a:p>
+            <a:p>
+              <a:pPr algn="ctr"/>
+              <a:endParaRPr lang="eu-ES" sz="1600" dirty="0"/>
+            </a:p>
+            <a:p>
+              <a:pPr algn="ctr"/>
+              <a:endParaRPr lang="eu-ES" sz="1600" dirty="0" smtClean="0"/>
+            </a:p>
+            <a:p>
+              <a:pPr algn="ctr"/>
+              <a:endParaRPr lang="eu-ES" sz="1600" dirty="0" smtClean="0"/>
+            </a:p>
+            <a:p>
+              <a:pPr algn="ctr"/>
+              <a:endParaRPr lang="eu-ES" sz="1600" dirty="0"/>
+            </a:p>
+            <a:p>
+              <a:pPr algn="ctr"/>
+              <a:endParaRPr lang="eu-ES" sz="1600" dirty="0" smtClean="0"/>
+            </a:p>
+            <a:p>
+              <a:pPr algn="ctr"/>
+              <a:endParaRPr lang="eu-ES" sz="1600" dirty="0"/>
+            </a:p>
+            <a:p>
+              <a:pPr algn="ctr"/>
+              <a:endParaRPr lang="eu-ES" sz="1600" dirty="0" smtClean="0"/>
+            </a:p>
+            <a:p>
+              <a:pPr algn="ctr"/>
+              <a:endParaRPr lang="eu-ES" sz="1600" dirty="0"/>
+            </a:p>
+            <a:p>
+              <a:pPr algn="ctr"/>
+              <a:endParaRPr lang="eu-ES" sz="1600" dirty="0"/>
+            </a:p>
+          </p:txBody>
+        </p:sp>
+        <p:sp>
+          <p:nvSpPr>
+            <p:cNvPr id="12" name="Cylindre 11"/>
+            <p:cNvSpPr/>
+            <p:nvPr/>
+          </p:nvSpPr>
+          <p:spPr>
+            <a:xfrm>
+              <a:off x="464604" y="1824887"/>
+              <a:ext cx="1563245" cy="1456310"/>
+            </a:xfrm>
+            <a:prstGeom prst="can">
+              <a:avLst>
+                <a:gd name="adj" fmla="val 16329"/>
+              </a:avLst>
+            </a:prstGeom>
+            <a:solidFill>
+              <a:srgbClr val="8000FF"/>
+            </a:solidFill>
+            <a:ln>
+              <a:solidFill>
+                <a:srgbClr val="000000"/>
+              </a:solidFill>
+            </a:ln>
+          </p:spPr>
+          <p:style>
+            <a:lnRef idx="1">
+              <a:schemeClr val="accent1"/>
+            </a:lnRef>
+            <a:fillRef idx="3">
+              <a:schemeClr val="accent1"/>
+            </a:fillRef>
+            <a:effectRef idx="2">
+              <a:schemeClr val="accent1"/>
+            </a:effectRef>
+            <a:fontRef idx="minor">
+              <a:schemeClr val="lt1"/>
+            </a:fontRef>
+          </p:style>
+          <p:txBody>
+            <a:bodyPr rtlCol="0" anchor="ctr"/>
+            <a:lstStyle/>
+            <a:p>
+              <a:pPr algn="ctr"/>
+              <a:r>
+                <a:rPr lang="fr-FR" sz="1600" dirty="0" smtClean="0">
+                  <a:solidFill>
+                    <a:schemeClr val="bg1"/>
+                  </a:solidFill>
+                </a:rPr>
+                <a:t>OpenETCS System requirements</a:t>
+              </a:r>
+              <a:endParaRPr lang="fr-FR" sz="1600" dirty="0">
+                <a:solidFill>
+                  <a:schemeClr val="bg1"/>
+                </a:solidFill>
+              </a:endParaRPr>
+            </a:p>
+            <a:p>
+              <a:pPr algn="ctr"/>
+              <a:endParaRPr lang="fr-FR" sz="1600" dirty="0" smtClean="0">
+                <a:solidFill>
+                  <a:schemeClr val="bg1"/>
+                </a:solidFill>
+              </a:endParaRPr>
+            </a:p>
+          </p:txBody>
+        </p:sp>
+        <p:sp>
+          <p:nvSpPr>
+            <p:cNvPr id="70" name="ZoneTexte 69"/>
+            <p:cNvSpPr txBox="1"/>
+            <p:nvPr/>
+          </p:nvSpPr>
+          <p:spPr>
+            <a:xfrm>
+              <a:off x="5676190" y="605755"/>
+              <a:ext cx="2204960" cy="317071"/>
+            </a:xfrm>
+            <a:prstGeom prst="rect">
+              <a:avLst/>
+            </a:prstGeom>
+            <a:noFill/>
+          </p:spPr>
+          <p:txBody>
+            <a:bodyPr wrap="none" rtlCol="0">
+              <a:spAutoFit/>
+            </a:bodyPr>
+            <a:lstStyle/>
+            <a:p>
+              <a:r>
+                <a:rPr lang="fr-FR" sz="1100" i="1" dirty="0" smtClean="0"/>
+                <a:t>OpenETCS </a:t>
+              </a:r>
+              <a:r>
+                <a:rPr lang="fr-FR" sz="1100" i="1" dirty="0" err="1" smtClean="0"/>
+                <a:t>product</a:t>
+              </a:r>
+              <a:r>
+                <a:rPr lang="fr-FR" sz="1100" i="1" dirty="0" smtClean="0"/>
+                <a:t> </a:t>
+              </a:r>
+              <a:r>
+                <a:rPr lang="fr-FR" sz="1100" i="1" dirty="0" err="1" smtClean="0"/>
+                <a:t>definition</a:t>
+              </a:r>
+              <a:endParaRPr lang="fr-FR" sz="1100" i="1" dirty="0"/>
+            </a:p>
+          </p:txBody>
+        </p:sp>
+        <p:pic>
+          <p:nvPicPr>
+            <p:cNvPr id="19" name="Image 18" descr="1stlevelarchitecture.PNG"/>
+            <p:cNvPicPr>
+              <a:picLocks noChangeAspect="1"/>
+            </p:cNvPicPr>
+            <p:nvPr/>
+          </p:nvPicPr>
+          <p:blipFill>
+            <a:blip r:embed="rId2">
+              <a:extLst>
+                <a:ext uri="{28A0092B-C50C-407E-A947-70E740481C1C}">
+                  <a14:useLocalDpi xmlns:a14="http://schemas.microsoft.com/office/drawing/2010/main" val="0"/>
+                </a:ext>
+              </a:extLst>
+            </a:blip>
+            <a:stretch>
+              <a:fillRect/>
+            </a:stretch>
+          </p:blipFill>
+          <p:spPr>
+            <a:xfrm>
+              <a:off x="3378531" y="2003078"/>
+              <a:ext cx="3400139" cy="2546884"/>
+            </a:xfrm>
+            <a:prstGeom prst="rect">
+              <a:avLst/>
+            </a:prstGeom>
+          </p:spPr>
+        </p:pic>
+        <p:sp>
+          <p:nvSpPr>
+            <p:cNvPr id="102" name="ZoneTexte 101"/>
+            <p:cNvSpPr txBox="1"/>
+            <p:nvPr/>
+          </p:nvSpPr>
+          <p:spPr>
+            <a:xfrm>
+              <a:off x="2134581" y="1996685"/>
+              <a:ext cx="1095531" cy="738664"/>
+            </a:xfrm>
+            <a:prstGeom prst="rect">
+              <a:avLst/>
+            </a:prstGeom>
+            <a:noFill/>
+          </p:spPr>
+          <p:txBody>
+            <a:bodyPr wrap="square" rtlCol="0">
+              <a:spAutoFit/>
+            </a:bodyPr>
+            <a:lstStyle/>
+            <a:p>
+              <a:r>
+                <a:rPr lang="fr-FR" sz="1400" dirty="0" err="1" smtClean="0">
+                  <a:solidFill>
+                    <a:srgbClr val="FF6600"/>
+                  </a:solidFill>
+                </a:rPr>
+                <a:t>External</a:t>
+              </a:r>
+              <a:r>
+                <a:rPr lang="fr-FR" sz="1400" dirty="0" smtClean="0">
+                  <a:solidFill>
+                    <a:srgbClr val="FF6600"/>
+                  </a:solidFill>
+                </a:rPr>
+                <a:t> System Interfaces</a:t>
+              </a:r>
+              <a:endParaRPr lang="fr-FR" sz="1400" dirty="0">
+                <a:solidFill>
+                  <a:srgbClr val="FF6600"/>
+                </a:solidFill>
+              </a:endParaRPr>
+            </a:p>
+          </p:txBody>
+        </p:sp>
+        <p:cxnSp>
+          <p:nvCxnSpPr>
+            <p:cNvPr id="137" name="Connecteur droit avec flèche 136"/>
+            <p:cNvCxnSpPr/>
+            <p:nvPr/>
+          </p:nvCxnSpPr>
+          <p:spPr>
+            <a:xfrm flipH="1">
+              <a:off x="2013402" y="2742668"/>
+              <a:ext cx="2095662" cy="0"/>
+            </a:xfrm>
+            <a:prstGeom prst="straightConnector1">
+              <a:avLst/>
+            </a:prstGeom>
+            <a:ln>
+              <a:solidFill>
+                <a:srgbClr val="FF6600"/>
+              </a:solidFill>
+              <a:prstDash val="sysDash"/>
+              <a:headEnd type="oval"/>
+              <a:tailEnd type="stealth" w="lg" len="lg"/>
+            </a:ln>
+          </p:spPr>
+          <p:style>
+            <a:lnRef idx="2">
+              <a:schemeClr val="accent1"/>
+            </a:lnRef>
+            <a:fillRef idx="0">
+              <a:schemeClr val="accent1"/>
+            </a:fillRef>
+            <a:effectRef idx="1">
+              <a:schemeClr val="accent1"/>
+            </a:effectRef>
+            <a:fontRef idx="minor">
+              <a:schemeClr val="tx1"/>
+            </a:fontRef>
+          </p:style>
+        </p:cxnSp>
+        <p:cxnSp>
+          <p:nvCxnSpPr>
+            <p:cNvPr id="110" name="Connecteur droit avec flèche 109"/>
+            <p:cNvCxnSpPr/>
+            <p:nvPr/>
+          </p:nvCxnSpPr>
+          <p:spPr>
+            <a:xfrm flipH="1">
+              <a:off x="2013402" y="2657292"/>
+              <a:ext cx="3376408" cy="309483"/>
+            </a:xfrm>
+            <a:prstGeom prst="straightConnector1">
+              <a:avLst/>
+            </a:prstGeom>
+            <a:ln>
+              <a:solidFill>
+                <a:srgbClr val="FF6600"/>
+              </a:solidFill>
+              <a:prstDash val="sysDash"/>
+              <a:headEnd type="oval"/>
+              <a:tailEnd type="stealth" w="lg" len="lg"/>
+            </a:ln>
+          </p:spPr>
+          <p:style>
+            <a:lnRef idx="2">
+              <a:schemeClr val="accent1"/>
+            </a:lnRef>
+            <a:fillRef idx="0">
+              <a:schemeClr val="accent1"/>
+            </a:fillRef>
+            <a:effectRef idx="1">
+              <a:schemeClr val="accent1"/>
+            </a:effectRef>
+            <a:fontRef idx="minor">
+              <a:schemeClr val="tx1"/>
+            </a:fontRef>
+          </p:style>
+        </p:cxnSp>
+        <p:cxnSp>
+          <p:nvCxnSpPr>
+            <p:cNvPr id="113" name="Connecteur droit avec flèche 112"/>
+            <p:cNvCxnSpPr/>
+            <p:nvPr/>
+          </p:nvCxnSpPr>
+          <p:spPr>
+            <a:xfrm flipH="1">
+              <a:off x="2027848" y="2966775"/>
+              <a:ext cx="2732262" cy="896436"/>
+            </a:xfrm>
+            <a:prstGeom prst="straightConnector1">
+              <a:avLst/>
+            </a:prstGeom>
+            <a:ln>
+              <a:solidFill>
+                <a:srgbClr val="FF6600"/>
+              </a:solidFill>
+              <a:prstDash val="sysDash"/>
+              <a:headEnd type="oval"/>
+              <a:tailEnd type="stealth" w="lg" len="lg"/>
+            </a:ln>
+          </p:spPr>
+          <p:style>
+            <a:lnRef idx="2">
+              <a:schemeClr val="accent1"/>
+            </a:lnRef>
+            <a:fillRef idx="0">
+              <a:schemeClr val="accent1"/>
+            </a:fillRef>
+            <a:effectRef idx="1">
+              <a:schemeClr val="accent1"/>
+            </a:effectRef>
+            <a:fontRef idx="minor">
+              <a:schemeClr val="tx1"/>
+            </a:fontRef>
+          </p:style>
+        </p:cxnSp>
+        <p:cxnSp>
+          <p:nvCxnSpPr>
+            <p:cNvPr id="135" name="Connecteur droit avec flèche 134"/>
+            <p:cNvCxnSpPr/>
+            <p:nvPr/>
+          </p:nvCxnSpPr>
+          <p:spPr>
+            <a:xfrm flipH="1">
+              <a:off x="2027848" y="3048492"/>
+              <a:ext cx="3361962" cy="1006812"/>
+            </a:xfrm>
+            <a:prstGeom prst="straightConnector1">
+              <a:avLst/>
+            </a:prstGeom>
+            <a:ln>
+              <a:solidFill>
+                <a:srgbClr val="FF6600"/>
+              </a:solidFill>
+              <a:prstDash val="sysDash"/>
+              <a:headEnd type="oval"/>
+              <a:tailEnd type="stealth" w="lg" len="lg"/>
+            </a:ln>
+          </p:spPr>
+          <p:style>
+            <a:lnRef idx="2">
+              <a:schemeClr val="accent1"/>
+            </a:lnRef>
+            <a:fillRef idx="0">
+              <a:schemeClr val="accent1"/>
+            </a:fillRef>
+            <a:effectRef idx="1">
+              <a:schemeClr val="accent1"/>
+            </a:effectRef>
+            <a:fontRef idx="minor">
+              <a:schemeClr val="tx1"/>
+            </a:fontRef>
+          </p:style>
+        </p:cxnSp>
+        <p:sp>
+          <p:nvSpPr>
+            <p:cNvPr id="145" name="ZoneTexte 144"/>
+            <p:cNvSpPr txBox="1"/>
+            <p:nvPr/>
+          </p:nvSpPr>
+          <p:spPr>
+            <a:xfrm>
+              <a:off x="1956524" y="3175851"/>
+              <a:ext cx="1095531" cy="523220"/>
+            </a:xfrm>
+            <a:prstGeom prst="rect">
+              <a:avLst/>
+            </a:prstGeom>
+            <a:noFill/>
+          </p:spPr>
+          <p:txBody>
+            <a:bodyPr wrap="square" rtlCol="0">
+              <a:spAutoFit/>
+            </a:bodyPr>
+            <a:lstStyle/>
+            <a:p>
+              <a:r>
+                <a:rPr lang="fr-FR" sz="1400" dirty="0" err="1" smtClean="0">
+                  <a:solidFill>
+                    <a:srgbClr val="FF6600"/>
+                  </a:solidFill>
+                </a:rPr>
+                <a:t>External</a:t>
+              </a:r>
+              <a:r>
+                <a:rPr lang="fr-FR" sz="1400" dirty="0" smtClean="0">
+                  <a:solidFill>
+                    <a:srgbClr val="FF6600"/>
+                  </a:solidFill>
+                </a:rPr>
+                <a:t> SW  Interfaces</a:t>
+              </a:r>
+              <a:endParaRPr lang="fr-FR" sz="1400" dirty="0">
+                <a:solidFill>
+                  <a:srgbClr val="FF6600"/>
+                </a:solidFill>
+              </a:endParaRPr>
+            </a:p>
+          </p:txBody>
+        </p:sp>
+        <p:grpSp>
+          <p:nvGrpSpPr>
+            <p:cNvPr id="146" name="Grouper 145"/>
+            <p:cNvGrpSpPr/>
+            <p:nvPr/>
+          </p:nvGrpSpPr>
+          <p:grpSpPr>
+            <a:xfrm>
+              <a:off x="993918" y="6166883"/>
+              <a:ext cx="2384613" cy="349407"/>
+              <a:chOff x="6390215" y="420861"/>
+              <a:chExt cx="2384613" cy="349407"/>
+            </a:xfrm>
+          </p:grpSpPr>
+          <p:cxnSp>
+            <p:nvCxnSpPr>
+              <p:cNvPr id="147" name="Connecteur droit avec flèche 146"/>
+              <p:cNvCxnSpPr/>
+              <p:nvPr/>
+            </p:nvCxnSpPr>
+            <p:spPr>
+              <a:xfrm flipH="1" flipV="1">
+                <a:off x="6737074" y="420861"/>
+                <a:ext cx="1642100" cy="5815"/>
+              </a:xfrm>
+              <a:prstGeom prst="straightConnector1">
+                <a:avLst/>
+              </a:prstGeom>
+              <a:ln>
+                <a:solidFill>
+                  <a:srgbClr val="FF6600"/>
+                </a:solidFill>
+                <a:prstDash val="sysDash"/>
+                <a:headEnd type="oval"/>
+                <a:tailEnd type="stealth" w="lg" len="lg"/>
+              </a:ln>
+            </p:spPr>
+            <p:style>
+              <a:lnRef idx="2">
+                <a:schemeClr val="accent1"/>
+              </a:lnRef>
+              <a:fillRef idx="0">
+                <a:schemeClr val="accent1"/>
+              </a:fillRef>
+              <a:effectRef idx="1">
+                <a:schemeClr val="accent1"/>
+              </a:effectRef>
+              <a:fontRef idx="minor">
+                <a:schemeClr val="tx1"/>
+              </a:fontRef>
+            </p:style>
+          </p:cxnSp>
+          <p:sp>
+            <p:nvSpPr>
+              <p:cNvPr id="148" name="ZoneTexte 147"/>
+              <p:cNvSpPr txBox="1"/>
+              <p:nvPr/>
+            </p:nvSpPr>
+            <p:spPr>
+              <a:xfrm>
+                <a:off x="6390215" y="462491"/>
+                <a:ext cx="2384613" cy="307777"/>
+              </a:xfrm>
+              <a:prstGeom prst="rect">
+                <a:avLst/>
+              </a:prstGeom>
+              <a:noFill/>
+            </p:spPr>
+            <p:txBody>
+              <a:bodyPr wrap="square" rtlCol="0">
+                <a:spAutoFit/>
+              </a:bodyPr>
+              <a:lstStyle/>
+              <a:p>
+                <a:pPr algn="ctr"/>
+                <a:r>
+                  <a:rPr lang="eu-ES" sz="1400" dirty="0" smtClean="0"/>
+                  <a:t>Deduce (create) requirements</a:t>
+                </a:r>
+                <a:endParaRPr lang="eu-ES" sz="1400" dirty="0"/>
+              </a:p>
+            </p:txBody>
+          </p:sp>
+        </p:grpSp>
+        <p:sp>
+          <p:nvSpPr>
+            <p:cNvPr id="20" name="Cylindre 19"/>
+            <p:cNvSpPr/>
+            <p:nvPr/>
+          </p:nvSpPr>
+          <p:spPr>
+            <a:xfrm>
+              <a:off x="464605" y="3437461"/>
+              <a:ext cx="1563244" cy="1164546"/>
+            </a:xfrm>
+            <a:prstGeom prst="can">
+              <a:avLst>
+                <a:gd name="adj" fmla="val 16329"/>
+              </a:avLst>
+            </a:prstGeom>
+            <a:solidFill>
+              <a:srgbClr val="FF00FF"/>
+            </a:solidFill>
+            <a:ln>
+              <a:solidFill>
+                <a:srgbClr val="000000"/>
+              </a:solidFill>
+            </a:ln>
+          </p:spPr>
+          <p:style>
+            <a:lnRef idx="1">
+              <a:schemeClr val="accent1"/>
+            </a:lnRef>
+            <a:fillRef idx="3">
+              <a:schemeClr val="accent1"/>
+            </a:fillRef>
+            <a:effectRef idx="2">
+              <a:schemeClr val="accent1"/>
+            </a:effectRef>
+            <a:fontRef idx="minor">
+              <a:schemeClr val="lt1"/>
+            </a:fontRef>
+          </p:style>
+          <p:txBody>
+            <a:bodyPr rtlCol="0" anchor="ctr"/>
+            <a:lstStyle/>
+            <a:p>
+              <a:pPr algn="ctr"/>
+              <a:endParaRPr lang="fr-FR" sz="1600" dirty="0" smtClean="0">
+                <a:solidFill>
+                  <a:schemeClr val="bg1"/>
+                </a:solidFill>
+              </a:endParaRPr>
+            </a:p>
+            <a:p>
+              <a:pPr algn="ctr"/>
+              <a:endParaRPr lang="fr-FR" sz="1600" dirty="0">
+                <a:solidFill>
+                  <a:schemeClr val="bg1"/>
+                </a:solidFill>
+              </a:endParaRPr>
+            </a:p>
+            <a:p>
+              <a:pPr algn="ctr"/>
+              <a:endParaRPr lang="fr-FR" sz="1600" dirty="0" smtClean="0">
+                <a:solidFill>
+                  <a:schemeClr val="bg1"/>
+                </a:solidFill>
+              </a:endParaRPr>
+            </a:p>
+            <a:p>
+              <a:pPr algn="ctr"/>
+              <a:endParaRPr lang="fr-FR" sz="1600" dirty="0" smtClean="0">
+                <a:solidFill>
+                  <a:schemeClr val="bg1"/>
+                </a:solidFill>
+              </a:endParaRPr>
+            </a:p>
+            <a:p>
+              <a:pPr algn="ctr"/>
+              <a:endParaRPr lang="fr-FR" sz="1600" dirty="0">
+                <a:solidFill>
+                  <a:schemeClr val="bg1"/>
+                </a:solidFill>
+              </a:endParaRPr>
+            </a:p>
+            <a:p>
+              <a:pPr algn="ctr"/>
+              <a:endParaRPr lang="fr-FR" sz="1600" dirty="0" smtClean="0">
+                <a:solidFill>
+                  <a:schemeClr val="bg1"/>
+                </a:solidFill>
+              </a:endParaRPr>
+            </a:p>
+            <a:p>
+              <a:pPr algn="ctr"/>
+              <a:r>
+                <a:rPr lang="fr-FR" sz="1600" dirty="0" smtClean="0">
+                  <a:solidFill>
+                    <a:schemeClr val="bg1"/>
+                  </a:solidFill>
+                </a:rPr>
+                <a:t>OpenETCS Software</a:t>
+              </a:r>
+            </a:p>
+            <a:p>
+              <a:pPr algn="ctr"/>
+              <a:r>
+                <a:rPr lang="fr-FR" sz="1600" dirty="0" smtClean="0">
+                  <a:solidFill>
+                    <a:schemeClr val="bg1"/>
+                  </a:solidFill>
+                </a:rPr>
+                <a:t>Requirements</a:t>
+              </a:r>
+            </a:p>
+            <a:p>
+              <a:pPr algn="ctr"/>
+              <a:endParaRPr lang="fr-FR" sz="1600" dirty="0">
+                <a:solidFill>
+                  <a:schemeClr val="bg1"/>
+                </a:solidFill>
+              </a:endParaRPr>
+            </a:p>
+            <a:p>
+              <a:pPr algn="ctr"/>
+              <a:endParaRPr lang="fr-FR" sz="1600" dirty="0" smtClean="0">
+                <a:solidFill>
+                  <a:schemeClr val="bg1"/>
+                </a:solidFill>
+              </a:endParaRPr>
+            </a:p>
+            <a:p>
+              <a:pPr algn="ctr"/>
+              <a:endParaRPr lang="fr-FR" sz="1600" dirty="0">
+                <a:solidFill>
+                  <a:schemeClr val="bg1"/>
+                </a:solidFill>
+              </a:endParaRPr>
+            </a:p>
+            <a:p>
+              <a:pPr algn="ctr"/>
+              <a:endParaRPr lang="fr-FR" sz="1600" dirty="0" smtClean="0">
+                <a:solidFill>
+                  <a:schemeClr val="bg1"/>
+                </a:solidFill>
+              </a:endParaRPr>
+            </a:p>
+            <a:p>
+              <a:pPr algn="ctr"/>
+              <a:endParaRPr lang="fr-FR" sz="1600" dirty="0" smtClean="0">
+                <a:solidFill>
+                  <a:schemeClr val="bg1"/>
+                </a:solidFill>
+              </a:endParaRPr>
+            </a:p>
+            <a:p>
+              <a:pPr algn="ctr"/>
+              <a:endParaRPr lang="fr-FR" sz="1600" dirty="0">
+                <a:solidFill>
+                  <a:schemeClr val="bg1"/>
+                </a:solidFill>
+              </a:endParaRPr>
+            </a:p>
+          </p:txBody>
+        </p:sp>
+        <p:cxnSp>
+          <p:nvCxnSpPr>
+            <p:cNvPr id="21" name="Connecteur droit avec flèche 20"/>
+            <p:cNvCxnSpPr/>
+            <p:nvPr/>
+          </p:nvCxnSpPr>
+          <p:spPr>
+            <a:xfrm>
+              <a:off x="2027848" y="1551710"/>
+              <a:ext cx="1350683" cy="668036"/>
+            </a:xfrm>
+            <a:prstGeom prst="straightConnector1">
+              <a:avLst/>
+            </a:prstGeom>
+            <a:ln>
+              <a:solidFill>
+                <a:srgbClr val="000000"/>
+              </a:solidFill>
+              <a:tailEnd type="arrow"/>
+            </a:ln>
+          </p:spPr>
+          <p:style>
+            <a:lnRef idx="2">
+              <a:schemeClr val="accent1"/>
+            </a:lnRef>
+            <a:fillRef idx="0">
+              <a:schemeClr val="accent1"/>
+            </a:fillRef>
+            <a:effectRef idx="1">
+              <a:schemeClr val="accent1"/>
+            </a:effectRef>
+            <a:fontRef idx="minor">
+              <a:schemeClr val="tx1"/>
+            </a:fontRef>
+          </p:style>
+        </p:cxnSp>
+        <p:cxnSp>
+          <p:nvCxnSpPr>
+            <p:cNvPr id="22" name="Connecteur droit avec flèche 21"/>
+            <p:cNvCxnSpPr/>
+            <p:nvPr/>
+          </p:nvCxnSpPr>
+          <p:spPr>
+            <a:xfrm>
+              <a:off x="6170776" y="6266355"/>
+              <a:ext cx="1535052" cy="0"/>
+            </a:xfrm>
+            <a:prstGeom prst="straightConnector1">
+              <a:avLst/>
+            </a:prstGeom>
+            <a:ln>
+              <a:solidFill>
+                <a:srgbClr val="000000"/>
+              </a:solidFill>
+              <a:tailEnd type="arrow"/>
+            </a:ln>
+          </p:spPr>
+          <p:style>
+            <a:lnRef idx="2">
+              <a:schemeClr val="accent1"/>
+            </a:lnRef>
+            <a:fillRef idx="0">
+              <a:schemeClr val="accent1"/>
+            </a:fillRef>
+            <a:effectRef idx="1">
+              <a:schemeClr val="accent1"/>
+            </a:effectRef>
+            <a:fontRef idx="minor">
+              <a:schemeClr val="tx1"/>
+            </a:fontRef>
+          </p:style>
+        </p:cxnSp>
+        <p:sp>
+          <p:nvSpPr>
+            <p:cNvPr id="27" name="Cylindre 26"/>
+            <p:cNvSpPr/>
+            <p:nvPr/>
+          </p:nvSpPr>
+          <p:spPr>
+            <a:xfrm>
+              <a:off x="436664" y="725155"/>
+              <a:ext cx="1836660" cy="826555"/>
+            </a:xfrm>
+            <a:prstGeom prst="can">
+              <a:avLst>
+                <a:gd name="adj" fmla="val 16329"/>
+              </a:avLst>
+            </a:prstGeom>
+            <a:solidFill>
+              <a:srgbClr val="8000FF"/>
+            </a:solidFill>
+            <a:ln>
+              <a:solidFill>
+                <a:srgbClr val="000000"/>
+              </a:solidFill>
+            </a:ln>
+          </p:spPr>
+          <p:style>
+            <a:lnRef idx="1">
+              <a:schemeClr val="accent1"/>
+            </a:lnRef>
+            <a:fillRef idx="3">
+              <a:schemeClr val="accent1"/>
+            </a:fillRef>
+            <a:effectRef idx="2">
+              <a:schemeClr val="accent1"/>
+            </a:effectRef>
+            <a:fontRef idx="minor">
+              <a:schemeClr val="lt1"/>
+            </a:fontRef>
+          </p:style>
+          <p:txBody>
+            <a:bodyPr rtlCol="0" anchor="ctr"/>
+            <a:lstStyle/>
+            <a:p>
+              <a:pPr algn="ctr"/>
+              <a:r>
+                <a:rPr lang="fr-FR" sz="1400" dirty="0" smtClean="0">
+                  <a:solidFill>
+                    <a:schemeClr val="bg1"/>
+                  </a:solidFill>
+                </a:rPr>
+                <a:t>OpenETCS </a:t>
+              </a:r>
+              <a:r>
+                <a:rPr lang="fr-FR" sz="1400" dirty="0" err="1" smtClean="0">
+                  <a:solidFill>
+                    <a:schemeClr val="bg1"/>
+                  </a:solidFill>
+                </a:rPr>
+                <a:t>stakeholder</a:t>
+              </a:r>
+              <a:r>
+                <a:rPr lang="fr-FR" sz="1400" dirty="0" smtClean="0">
+                  <a:solidFill>
+                    <a:schemeClr val="bg1"/>
+                  </a:solidFill>
+                </a:rPr>
+                <a:t> </a:t>
+              </a:r>
+            </a:p>
+            <a:p>
+              <a:pPr algn="ctr"/>
+              <a:r>
+                <a:rPr lang="fr-FR" sz="1400" dirty="0" err="1" smtClean="0">
+                  <a:solidFill>
+                    <a:schemeClr val="bg1"/>
+                  </a:solidFill>
+                </a:rPr>
+                <a:t>reference</a:t>
+              </a:r>
+              <a:r>
+                <a:rPr lang="fr-FR" sz="1400" dirty="0" smtClean="0">
+                  <a:solidFill>
+                    <a:schemeClr val="bg1"/>
+                  </a:solidFill>
+                </a:rPr>
+                <a:t> (</a:t>
+              </a:r>
+              <a:r>
+                <a:rPr lang="fr-FR" sz="1400" dirty="0" err="1" smtClean="0">
+                  <a:solidFill>
+                    <a:schemeClr val="bg1"/>
+                  </a:solidFill>
+                </a:rPr>
+                <a:t>baselined</a:t>
+              </a:r>
+              <a:r>
+                <a:rPr lang="fr-FR" sz="1400" dirty="0" smtClean="0">
+                  <a:solidFill>
+                    <a:schemeClr val="bg1"/>
+                  </a:solidFill>
+                </a:rPr>
+                <a:t>) requirements</a:t>
+              </a:r>
+              <a:endParaRPr lang="fr-FR" sz="1400" dirty="0">
+                <a:solidFill>
+                  <a:schemeClr val="bg1"/>
+                </a:solidFill>
+              </a:endParaRPr>
+            </a:p>
+          </p:txBody>
+        </p:sp>
+        <p:cxnSp>
+          <p:nvCxnSpPr>
+            <p:cNvPr id="28" name="Connecteur droit avec flèche 27"/>
+            <p:cNvCxnSpPr>
+              <a:endCxn id="19" idx="1"/>
+            </p:cNvCxnSpPr>
+            <p:nvPr/>
+          </p:nvCxnSpPr>
+          <p:spPr>
+            <a:xfrm>
+              <a:off x="2027849" y="3146094"/>
+              <a:ext cx="1350682" cy="130426"/>
+            </a:xfrm>
+            <a:prstGeom prst="straightConnector1">
+              <a:avLst/>
+            </a:prstGeom>
+            <a:ln>
+              <a:solidFill>
+                <a:srgbClr val="000000"/>
+              </a:solidFill>
+              <a:tailEnd type="arrow"/>
+            </a:ln>
+          </p:spPr>
+          <p:style>
+            <a:lnRef idx="2">
+              <a:schemeClr val="accent1"/>
+            </a:lnRef>
+            <a:fillRef idx="0">
+              <a:schemeClr val="accent1"/>
+            </a:fillRef>
+            <a:effectRef idx="1">
+              <a:schemeClr val="accent1"/>
+            </a:effectRef>
+            <a:fontRef idx="minor">
+              <a:schemeClr val="tx1"/>
+            </a:fontRef>
+          </p:style>
+        </p:cxnSp>
+        <p:cxnSp>
+          <p:nvCxnSpPr>
+            <p:cNvPr id="31" name="Connecteur droit avec flèche 30"/>
+            <p:cNvCxnSpPr/>
+            <p:nvPr/>
+          </p:nvCxnSpPr>
+          <p:spPr>
+            <a:xfrm flipV="1">
+              <a:off x="1268408" y="3055457"/>
+              <a:ext cx="3525" cy="533517"/>
+            </a:xfrm>
+            <a:prstGeom prst="straightConnector1">
+              <a:avLst/>
+            </a:prstGeom>
+            <a:ln w="57150" cmpd="sng">
+              <a:solidFill>
+                <a:srgbClr val="FF0000"/>
+              </a:solidFill>
+              <a:tailEnd type="arrow"/>
+            </a:ln>
+          </p:spPr>
+          <p:style>
+            <a:lnRef idx="2">
+              <a:schemeClr val="accent1"/>
+            </a:lnRef>
+            <a:fillRef idx="0">
+              <a:schemeClr val="accent1"/>
+            </a:fillRef>
+            <a:effectRef idx="1">
+              <a:schemeClr val="accent1"/>
+            </a:effectRef>
+            <a:fontRef idx="minor">
+              <a:schemeClr val="tx1"/>
+            </a:fontRef>
+          </p:style>
+        </p:cxnSp>
+        <p:cxnSp>
+          <p:nvCxnSpPr>
+            <p:cNvPr id="32" name="Connecteur droit avec flèche 31"/>
+            <p:cNvCxnSpPr/>
+            <p:nvPr/>
+          </p:nvCxnSpPr>
+          <p:spPr>
+            <a:xfrm flipH="1">
+              <a:off x="4324611" y="6309042"/>
+              <a:ext cx="976304" cy="1"/>
+            </a:xfrm>
+            <a:prstGeom prst="straightConnector1">
+              <a:avLst/>
+            </a:prstGeom>
+            <a:ln w="57150" cmpd="sng">
+              <a:solidFill>
+                <a:srgbClr val="FF0000"/>
+              </a:solidFill>
+              <a:tailEnd type="arrow"/>
+            </a:ln>
+          </p:spPr>
+          <p:style>
+            <a:lnRef idx="2">
+              <a:schemeClr val="accent1"/>
+            </a:lnRef>
+            <a:fillRef idx="0">
+              <a:schemeClr val="accent1"/>
+            </a:fillRef>
+            <a:effectRef idx="1">
+              <a:schemeClr val="accent1"/>
+            </a:effectRef>
+            <a:fontRef idx="minor">
+              <a:schemeClr val="tx1"/>
+            </a:fontRef>
+          </p:style>
+        </p:cxnSp>
+        <p:sp>
+          <p:nvSpPr>
+            <p:cNvPr id="33" name="ZoneTexte 32"/>
+            <p:cNvSpPr txBox="1"/>
+            <p:nvPr/>
+          </p:nvSpPr>
+          <p:spPr>
+            <a:xfrm>
+              <a:off x="3627441" y="6362158"/>
+              <a:ext cx="2384613" cy="307777"/>
+            </a:xfrm>
+            <a:prstGeom prst="rect">
+              <a:avLst/>
+            </a:prstGeom>
+            <a:noFill/>
+          </p:spPr>
+          <p:txBody>
+            <a:bodyPr wrap="square" rtlCol="0">
+              <a:spAutoFit/>
+            </a:bodyPr>
+            <a:lstStyle/>
+            <a:p>
+              <a:pPr algn="ctr"/>
+              <a:r>
+                <a:rPr lang="eu-ES" sz="1400" dirty="0" smtClean="0"/>
+                <a:t>Trace</a:t>
+              </a:r>
+              <a:endParaRPr lang="eu-ES" sz="1400" dirty="0"/>
+            </a:p>
+          </p:txBody>
+        </p:sp>
+        <p:cxnSp>
+          <p:nvCxnSpPr>
+            <p:cNvPr id="34" name="Connecteur droit avec flèche 33"/>
+            <p:cNvCxnSpPr/>
+            <p:nvPr/>
+          </p:nvCxnSpPr>
+          <p:spPr>
+            <a:xfrm flipV="1">
+              <a:off x="1271933" y="1469561"/>
+              <a:ext cx="3525" cy="533517"/>
+            </a:xfrm>
+            <a:prstGeom prst="straightConnector1">
+              <a:avLst/>
+            </a:prstGeom>
+            <a:ln w="57150" cmpd="sng">
+              <a:solidFill>
+                <a:srgbClr val="FF0000"/>
+              </a:solidFill>
+              <a:tailEnd type="arrow"/>
+            </a:ln>
+          </p:spPr>
+          <p:style>
+            <a:lnRef idx="2">
+              <a:schemeClr val="accent1"/>
+            </a:lnRef>
+            <a:fillRef idx="0">
+              <a:schemeClr val="accent1"/>
+            </a:fillRef>
+            <a:effectRef idx="1">
+              <a:schemeClr val="accent1"/>
+            </a:effectRef>
+            <a:fontRef idx="minor">
+              <a:schemeClr val="tx1"/>
+            </a:fontRef>
+          </p:style>
+        </p:cxnSp>
+      </p:grpSp>
+    </p:spTree>
+    <p:extLst>
+      <p:ext uri="{BB962C8B-B14F-4D97-AF65-F5344CB8AC3E}">
+        <p14:creationId xmlns:p14="http://schemas.microsoft.com/office/powerpoint/2010/main" val="2650341824"/>
+      </p:ext>
+    </p:extLst>
+  </p:cSld>
+  <p:clrMapOvr>
+    <a:masterClrMapping/>
+  </p:clrMapOvr>
+</p:sld>
+</file>
+
+<file path=ppt/slides/slide33.xml><?xml version="1.0" encoding="utf-8"?>
+<p:sld xmlns:a="http://schemas.openxmlformats.org/drawingml/2006/main" xmlns:r="http://schemas.openxmlformats.org/officeDocument/2006/relationships" xmlns:p="http://schemas.openxmlformats.org/presentationml/2006/main">
+  <p:cSld>
+    <p:spTree>
+      <p:nvGrpSpPr>
+        <p:cNvPr id="1" name=""/>
+        <p:cNvGrpSpPr/>
+        <p:nvPr/>
+      </p:nvGrpSpPr>
+      <p:grpSpPr>
+        <a:xfrm>
+          <a:off x="0" y="0"/>
+          <a:ext cx="0" cy="0"/>
+          <a:chOff x="0" y="0"/>
+          <a:chExt cx="0" cy="0"/>
+        </a:xfrm>
+      </p:grpSpPr>
+      <p:grpSp>
+        <p:nvGrpSpPr>
+          <p:cNvPr id="9" name="Grouper 8"/>
+          <p:cNvGrpSpPr/>
+          <p:nvPr/>
+        </p:nvGrpSpPr>
+        <p:grpSpPr>
+          <a:xfrm>
+            <a:off x="387049" y="584603"/>
+            <a:ext cx="7232951" cy="5178778"/>
+            <a:chOff x="387049" y="584603"/>
+            <a:chExt cx="7232951" cy="5178778"/>
+          </a:xfrm>
+        </p:grpSpPr>
+        <p:grpSp>
+          <p:nvGrpSpPr>
+            <p:cNvPr id="4" name="Grouper 3"/>
+            <p:cNvGrpSpPr/>
+            <p:nvPr/>
+          </p:nvGrpSpPr>
+          <p:grpSpPr>
+            <a:xfrm>
+              <a:off x="387049" y="584603"/>
+              <a:ext cx="7232951" cy="5178778"/>
+              <a:chOff x="387049" y="584603"/>
+              <a:chExt cx="7232951" cy="5178778"/>
+            </a:xfrm>
+          </p:grpSpPr>
+          <p:sp>
+            <p:nvSpPr>
+              <p:cNvPr id="30" name="Cylindre 29"/>
+              <p:cNvSpPr/>
+              <p:nvPr/>
+            </p:nvSpPr>
+            <p:spPr>
+              <a:xfrm>
+                <a:off x="443372" y="2358571"/>
+                <a:ext cx="1800295" cy="2025953"/>
+              </a:xfrm>
+              <a:prstGeom prst="can">
+                <a:avLst>
+                  <a:gd name="adj" fmla="val 5994"/>
+                </a:avLst>
+              </a:prstGeom>
+              <a:gradFill flip="none" rotWithShape="1">
+                <a:gsLst>
+                  <a:gs pos="0">
+                    <a:srgbClr val="8000FF"/>
+                  </a:gs>
+                  <a:gs pos="100000">
+                    <a:srgbClr val="FF00FF"/>
+                  </a:gs>
+                </a:gsLst>
+                <a:lin ang="5400000" scaled="0"/>
+                <a:tileRect/>
+              </a:gradFill>
+              <a:ln>
+                <a:solidFill>
+                  <a:srgbClr val="000000"/>
+                </a:solidFill>
+              </a:ln>
+            </p:spPr>
+            <p:style>
+              <a:lnRef idx="1">
+                <a:schemeClr val="accent1"/>
+              </a:lnRef>
+              <a:fillRef idx="3">
+                <a:schemeClr val="accent1"/>
+              </a:fillRef>
+              <a:effectRef idx="2">
+                <a:schemeClr val="accent1"/>
+              </a:effectRef>
+              <a:fontRef idx="minor">
+                <a:schemeClr val="lt1"/>
+              </a:fontRef>
+            </p:style>
+            <p:txBody>
+              <a:bodyPr rtlCol="0" anchor="ctr"/>
+              <a:lstStyle/>
+              <a:p>
+                <a:pPr algn="ctr"/>
+                <a:endParaRPr lang="fr-FR" sz="1600" dirty="0" smtClean="0">
+                  <a:solidFill>
+                    <a:schemeClr val="bg1"/>
+                  </a:solidFill>
+                </a:endParaRPr>
+              </a:p>
+              <a:p>
+                <a:pPr algn="ctr"/>
+                <a:r>
+                  <a:rPr lang="fr-FR" sz="1400" dirty="0" err="1" smtClean="0">
+                    <a:solidFill>
+                      <a:schemeClr val="bg1"/>
+                    </a:solidFill>
+                  </a:rPr>
+                  <a:t>Additional</a:t>
+                </a:r>
+                <a:r>
+                  <a:rPr lang="fr-FR" sz="1400" dirty="0" smtClean="0">
+                    <a:solidFill>
+                      <a:schemeClr val="bg1"/>
+                    </a:solidFill>
+                  </a:rPr>
+                  <a:t> openETCS requirements</a:t>
+                </a:r>
+              </a:p>
+              <a:p>
+                <a:pPr algn="ctr"/>
+                <a:endParaRPr lang="fr-FR" sz="1400" dirty="0">
+                  <a:solidFill>
+                    <a:schemeClr val="bg1"/>
+                  </a:solidFill>
+                </a:endParaRPr>
+              </a:p>
+            </p:txBody>
+          </p:sp>
+          <p:sp>
+            <p:nvSpPr>
+              <p:cNvPr id="29" name="Cylindre 28"/>
+              <p:cNvSpPr/>
+              <p:nvPr/>
+            </p:nvSpPr>
+            <p:spPr>
+              <a:xfrm>
+                <a:off x="443372" y="1173905"/>
+                <a:ext cx="1800295" cy="1096454"/>
+              </a:xfrm>
+              <a:prstGeom prst="can">
+                <a:avLst>
+                  <a:gd name="adj" fmla="val 8009"/>
+                </a:avLst>
+              </a:prstGeom>
+              <a:gradFill flip="none" rotWithShape="1">
+                <a:gsLst>
+                  <a:gs pos="0">
+                    <a:srgbClr val="8000FF"/>
+                  </a:gs>
+                  <a:gs pos="100000">
+                    <a:srgbClr val="FF00FF"/>
+                  </a:gs>
+                </a:gsLst>
+                <a:lin ang="5400000" scaled="0"/>
+                <a:tileRect/>
+              </a:gradFill>
+              <a:ln>
+                <a:solidFill>
+                  <a:srgbClr val="000000"/>
+                </a:solidFill>
+              </a:ln>
+            </p:spPr>
+            <p:style>
+              <a:lnRef idx="1">
+                <a:schemeClr val="accent1"/>
+              </a:lnRef>
+              <a:fillRef idx="3">
+                <a:schemeClr val="accent1"/>
+              </a:fillRef>
+              <a:effectRef idx="2">
+                <a:schemeClr val="accent1"/>
+              </a:effectRef>
+              <a:fontRef idx="minor">
+                <a:schemeClr val="lt1"/>
+              </a:fontRef>
+            </p:style>
+            <p:txBody>
+              <a:bodyPr rtlCol="0" anchor="ctr"/>
+              <a:lstStyle/>
+              <a:p>
+                <a:pPr algn="ctr"/>
+                <a:r>
+                  <a:rPr lang="fr-FR" sz="1600" dirty="0" smtClean="0">
+                    <a:solidFill>
+                      <a:schemeClr val="bg1"/>
+                    </a:solidFill>
+                  </a:rPr>
+                  <a:t>SRS </a:t>
+                </a:r>
+                <a:r>
+                  <a:rPr lang="fr-FR" sz="1600" dirty="0" err="1" smtClean="0">
+                    <a:solidFill>
+                      <a:schemeClr val="bg1"/>
+                    </a:solidFill>
+                  </a:rPr>
+                  <a:t>Subset</a:t>
+                </a:r>
+                <a:r>
+                  <a:rPr lang="fr-FR" sz="1600" dirty="0" smtClean="0">
+                    <a:solidFill>
+                      <a:schemeClr val="bg1"/>
+                    </a:solidFill>
+                  </a:rPr>
+                  <a:t> 26 requirements</a:t>
+                </a:r>
+              </a:p>
+              <a:p>
+                <a:pPr algn="ctr"/>
+                <a:r>
+                  <a:rPr lang="fr-FR" sz="1600" dirty="0" smtClean="0">
+                    <a:solidFill>
+                      <a:schemeClr val="bg1"/>
+                    </a:solidFill>
+                  </a:rPr>
+                  <a:t>as .ReqIF files</a:t>
+                </a:r>
+                <a:endParaRPr lang="fr-FR" sz="1600" dirty="0">
+                  <a:solidFill>
+                    <a:schemeClr val="bg1"/>
+                  </a:solidFill>
+                </a:endParaRPr>
+              </a:p>
+            </p:txBody>
+          </p:sp>
+          <p:sp>
+            <p:nvSpPr>
+              <p:cNvPr id="23" name="ZoneTexte 22"/>
+              <p:cNvSpPr txBox="1"/>
+              <p:nvPr/>
+            </p:nvSpPr>
+            <p:spPr>
+              <a:xfrm>
+                <a:off x="4849684" y="5311540"/>
+                <a:ext cx="2384613" cy="307777"/>
+              </a:xfrm>
+              <a:prstGeom prst="rect">
+                <a:avLst/>
+              </a:prstGeom>
+              <a:noFill/>
+            </p:spPr>
+            <p:txBody>
+              <a:bodyPr wrap="square" rtlCol="0">
+                <a:spAutoFit/>
+              </a:bodyPr>
+              <a:lstStyle/>
+              <a:p>
+                <a:pPr algn="ctr"/>
+                <a:r>
+                  <a:rPr lang="eu-ES" sz="1400" dirty="0" smtClean="0"/>
+                  <a:t>Requirement analysis</a:t>
+                </a:r>
+                <a:endParaRPr lang="eu-ES" sz="1400" dirty="0"/>
+              </a:p>
+            </p:txBody>
+          </p:sp>
+          <p:grpSp>
+            <p:nvGrpSpPr>
+              <p:cNvPr id="5" name="Grouper 4"/>
+              <p:cNvGrpSpPr/>
+              <p:nvPr/>
+            </p:nvGrpSpPr>
+            <p:grpSpPr>
+              <a:xfrm>
+                <a:off x="387049" y="584603"/>
+                <a:ext cx="7232951" cy="5178778"/>
+                <a:chOff x="387049" y="584603"/>
+                <a:chExt cx="7232951" cy="5178778"/>
+              </a:xfrm>
+            </p:grpSpPr>
+            <p:sp>
+              <p:nvSpPr>
+                <p:cNvPr id="68" name="Rectangle 67"/>
+                <p:cNvSpPr/>
+                <p:nvPr/>
+              </p:nvSpPr>
+              <p:spPr>
+                <a:xfrm>
+                  <a:off x="387049" y="584603"/>
+                  <a:ext cx="7232951" cy="5178778"/>
+                </a:xfrm>
+                <a:prstGeom prst="rect">
+                  <a:avLst/>
+                </a:prstGeom>
+                <a:solidFill>
+                  <a:schemeClr val="bg1">
+                    <a:lumMod val="85000"/>
+                    <a:alpha val="18000"/>
+                  </a:schemeClr>
+                </a:solidFill>
+                <a:ln>
+                  <a:solidFill>
+                    <a:schemeClr val="tx1"/>
+                  </a:solidFill>
+                </a:ln>
+              </p:spPr>
+              <p:style>
+                <a:lnRef idx="1">
+                  <a:schemeClr val="accent1"/>
+                </a:lnRef>
+                <a:fillRef idx="3">
+                  <a:schemeClr val="accent1"/>
+                </a:fillRef>
+                <a:effectRef idx="2">
+                  <a:schemeClr val="accent1"/>
+                </a:effectRef>
+                <a:fontRef idx="minor">
+                  <a:schemeClr val="lt1"/>
+                </a:fontRef>
+              </p:style>
+              <p:txBody>
+                <a:bodyPr rtlCol="0" anchor="ctr"/>
+                <a:lstStyle/>
+                <a:p>
+                  <a:pPr algn="ctr"/>
+                  <a:endParaRPr lang="fr-FR"/>
+                </a:p>
+              </p:txBody>
+            </p:sp>
+            <p:sp>
+              <p:nvSpPr>
+                <p:cNvPr id="11" name="Rectangle à coins arrondis 10"/>
+                <p:cNvSpPr/>
+                <p:nvPr/>
+              </p:nvSpPr>
+              <p:spPr>
+                <a:xfrm>
+                  <a:off x="3116486" y="1173904"/>
+                  <a:ext cx="3842239" cy="3831195"/>
+                </a:xfrm>
+                <a:prstGeom prst="roundRect">
+                  <a:avLst/>
+                </a:prstGeom>
+                <a:solidFill>
+                  <a:srgbClr val="3366FF"/>
+                </a:solidFill>
+              </p:spPr>
+              <p:style>
+                <a:lnRef idx="1">
+                  <a:schemeClr val="accent1"/>
+                </a:lnRef>
+                <a:fillRef idx="3">
+                  <a:schemeClr val="accent1"/>
+                </a:fillRef>
+                <a:effectRef idx="2">
+                  <a:schemeClr val="accent1"/>
+                </a:effectRef>
+                <a:fontRef idx="minor">
+                  <a:schemeClr val="lt1"/>
+                </a:fontRef>
+              </p:style>
+              <p:txBody>
+                <a:bodyPr rtlCol="0" anchor="ctr"/>
+                <a:lstStyle/>
+                <a:p>
+                  <a:pPr algn="ctr"/>
+                  <a:r>
+                    <a:rPr lang="eu-ES" sz="1600" dirty="0" smtClean="0"/>
+                    <a:t>OpenETCS architecture SysML model - system level definition</a:t>
+                  </a:r>
+                </a:p>
+                <a:p>
+                  <a:pPr algn="ctr"/>
+                  <a:endParaRPr lang="eu-ES" sz="1600" dirty="0"/>
+                </a:p>
+                <a:p>
+                  <a:pPr algn="ctr"/>
+                  <a:endParaRPr lang="eu-ES" sz="1600" dirty="0" smtClean="0"/>
+                </a:p>
+                <a:p>
+                  <a:pPr algn="ctr"/>
+                  <a:endParaRPr lang="eu-ES" sz="1600" dirty="0"/>
+                </a:p>
+                <a:p>
+                  <a:pPr algn="ctr"/>
+                  <a:endParaRPr lang="eu-ES" sz="1600" dirty="0" smtClean="0"/>
+                </a:p>
+                <a:p>
+                  <a:pPr algn="ctr"/>
+                  <a:endParaRPr lang="eu-ES" sz="1600" dirty="0"/>
+                </a:p>
+                <a:p>
+                  <a:pPr algn="ctr"/>
+                  <a:endParaRPr lang="eu-ES" sz="1600" dirty="0" smtClean="0"/>
+                </a:p>
+                <a:p>
+                  <a:pPr algn="ctr"/>
+                  <a:endParaRPr lang="eu-ES" sz="1600" dirty="0" smtClean="0"/>
+                </a:p>
+                <a:p>
+                  <a:pPr algn="ctr"/>
+                  <a:endParaRPr lang="eu-ES" sz="1600" dirty="0"/>
+                </a:p>
+                <a:p>
+                  <a:pPr algn="ctr"/>
+                  <a:endParaRPr lang="eu-ES" sz="1600" dirty="0" smtClean="0"/>
+                </a:p>
+                <a:p>
+                  <a:pPr algn="ctr"/>
+                  <a:endParaRPr lang="eu-ES" sz="1600" dirty="0"/>
+                </a:p>
+                <a:p>
+                  <a:pPr algn="ctr"/>
+                  <a:endParaRPr lang="eu-ES" sz="1600" dirty="0" smtClean="0"/>
+                </a:p>
+                <a:p>
+                  <a:pPr algn="ctr"/>
+                  <a:endParaRPr lang="eu-ES" sz="1600" dirty="0"/>
+                </a:p>
+                <a:p>
+                  <a:pPr algn="ctr"/>
+                  <a:endParaRPr lang="eu-ES" sz="1600" dirty="0"/>
+                </a:p>
+              </p:txBody>
+            </p:sp>
+            <p:sp>
+              <p:nvSpPr>
+                <p:cNvPr id="70" name="ZoneTexte 69"/>
+                <p:cNvSpPr txBox="1"/>
+                <p:nvPr/>
+              </p:nvSpPr>
+              <p:spPr>
+                <a:xfrm>
+                  <a:off x="448855" y="605755"/>
+                  <a:ext cx="2204960" cy="317071"/>
+                </a:xfrm>
+                <a:prstGeom prst="rect">
+                  <a:avLst/>
+                </a:prstGeom>
+                <a:noFill/>
+              </p:spPr>
+              <p:txBody>
+                <a:bodyPr wrap="none" rtlCol="0">
+                  <a:spAutoFit/>
+                </a:bodyPr>
+                <a:lstStyle/>
+                <a:p>
+                  <a:r>
+                    <a:rPr lang="fr-FR" sz="1100" i="1" dirty="0" smtClean="0"/>
+                    <a:t>OpenETCS </a:t>
+                  </a:r>
+                  <a:r>
+                    <a:rPr lang="fr-FR" sz="1100" i="1" dirty="0" err="1" smtClean="0"/>
+                    <a:t>product</a:t>
+                  </a:r>
+                  <a:r>
+                    <a:rPr lang="fr-FR" sz="1100" i="1" dirty="0" smtClean="0"/>
+                    <a:t> </a:t>
+                  </a:r>
+                  <a:r>
+                    <a:rPr lang="fr-FR" sz="1100" i="1" dirty="0" err="1" smtClean="0"/>
+                    <a:t>definition</a:t>
+                  </a:r>
+                  <a:endParaRPr lang="fr-FR" sz="1100" i="1" dirty="0"/>
+                </a:p>
+              </p:txBody>
+            </p:sp>
+            <p:pic>
+              <p:nvPicPr>
+                <p:cNvPr id="19" name="Image 18" descr="1stlevelarchitecture.PNG"/>
+                <p:cNvPicPr>
+                  <a:picLocks noChangeAspect="1"/>
+                </p:cNvPicPr>
+                <p:nvPr/>
+              </p:nvPicPr>
+              <p:blipFill>
+                <a:blip r:embed="rId2">
+                  <a:extLst>
+                    <a:ext uri="{28A0092B-C50C-407E-A947-70E740481C1C}">
+                      <a14:useLocalDpi xmlns:a14="http://schemas.microsoft.com/office/drawing/2010/main" val="0"/>
+                    </a:ext>
+                  </a:extLst>
+                </a:blip>
+                <a:stretch>
+                  <a:fillRect/>
+                </a:stretch>
+              </p:blipFill>
+              <p:spPr>
+                <a:xfrm>
+                  <a:off x="3378531" y="2003078"/>
+                  <a:ext cx="3400139" cy="2546884"/>
+                </a:xfrm>
+                <a:prstGeom prst="rect">
+                  <a:avLst/>
+                </a:prstGeom>
+              </p:spPr>
+            </p:pic>
+            <p:sp>
+              <p:nvSpPr>
+                <p:cNvPr id="102" name="ZoneTexte 101"/>
+                <p:cNvSpPr txBox="1"/>
+                <p:nvPr/>
+              </p:nvSpPr>
+              <p:spPr>
+                <a:xfrm>
+                  <a:off x="2154349" y="2051117"/>
+                  <a:ext cx="1095531" cy="738664"/>
+                </a:xfrm>
+                <a:prstGeom prst="rect">
+                  <a:avLst/>
+                </a:prstGeom>
+                <a:noFill/>
+              </p:spPr>
+              <p:txBody>
+                <a:bodyPr wrap="square" rtlCol="0">
+                  <a:spAutoFit/>
+                </a:bodyPr>
+                <a:lstStyle/>
+                <a:p>
+                  <a:pPr algn="ctr"/>
+                  <a:r>
+                    <a:rPr lang="fr-FR" sz="1400" dirty="0" err="1" smtClean="0">
+                      <a:solidFill>
+                        <a:srgbClr val="FF6600"/>
+                      </a:solidFill>
+                    </a:rPr>
+                    <a:t>External</a:t>
+                  </a:r>
+                  <a:r>
+                    <a:rPr lang="fr-FR" sz="1400" dirty="0" smtClean="0">
+                      <a:solidFill>
+                        <a:srgbClr val="FF6600"/>
+                      </a:solidFill>
+                    </a:rPr>
+                    <a:t> System Interfaces</a:t>
+                  </a:r>
+                  <a:endParaRPr lang="fr-FR" sz="1400" dirty="0">
+                    <a:solidFill>
+                      <a:srgbClr val="FF6600"/>
+                    </a:solidFill>
+                  </a:endParaRPr>
+                </a:p>
+              </p:txBody>
+            </p:sp>
+            <p:cxnSp>
+              <p:nvCxnSpPr>
+                <p:cNvPr id="137" name="Connecteur droit avec flèche 136"/>
+                <p:cNvCxnSpPr/>
+                <p:nvPr/>
+              </p:nvCxnSpPr>
+              <p:spPr>
+                <a:xfrm flipH="1">
+                  <a:off x="2013402" y="2742668"/>
+                  <a:ext cx="2095662" cy="0"/>
+                </a:xfrm>
+                <a:prstGeom prst="straightConnector1">
+                  <a:avLst/>
+                </a:prstGeom>
+                <a:ln>
+                  <a:solidFill>
+                    <a:srgbClr val="FF6600"/>
+                  </a:solidFill>
+                  <a:prstDash val="sysDash"/>
+                  <a:headEnd type="oval"/>
+                  <a:tailEnd type="stealth" w="lg" len="lg"/>
+                </a:ln>
+              </p:spPr>
+              <p:style>
+                <a:lnRef idx="2">
+                  <a:schemeClr val="accent1"/>
+                </a:lnRef>
+                <a:fillRef idx="0">
+                  <a:schemeClr val="accent1"/>
+                </a:fillRef>
+                <a:effectRef idx="1">
+                  <a:schemeClr val="accent1"/>
+                </a:effectRef>
+                <a:fontRef idx="minor">
+                  <a:schemeClr val="tx1"/>
+                </a:fontRef>
+              </p:style>
+            </p:cxnSp>
+            <p:cxnSp>
+              <p:nvCxnSpPr>
+                <p:cNvPr id="113" name="Connecteur droit avec flèche 112"/>
+                <p:cNvCxnSpPr/>
+                <p:nvPr/>
+              </p:nvCxnSpPr>
+              <p:spPr>
+                <a:xfrm flipH="1">
+                  <a:off x="2027848" y="2966775"/>
+                  <a:ext cx="2732262" cy="896436"/>
+                </a:xfrm>
+                <a:prstGeom prst="straightConnector1">
+                  <a:avLst/>
+                </a:prstGeom>
+                <a:ln>
+                  <a:solidFill>
+                    <a:srgbClr val="FF6600"/>
+                  </a:solidFill>
+                  <a:prstDash val="sysDash"/>
+                  <a:headEnd type="oval"/>
+                  <a:tailEnd type="stealth" w="lg" len="lg"/>
+                </a:ln>
+              </p:spPr>
+              <p:style>
+                <a:lnRef idx="2">
+                  <a:schemeClr val="accent1"/>
+                </a:lnRef>
+                <a:fillRef idx="0">
+                  <a:schemeClr val="accent1"/>
+                </a:fillRef>
+                <a:effectRef idx="1">
+                  <a:schemeClr val="accent1"/>
+                </a:effectRef>
+                <a:fontRef idx="minor">
+                  <a:schemeClr val="tx1"/>
+                </a:fontRef>
+              </p:style>
+            </p:cxnSp>
+            <p:cxnSp>
+              <p:nvCxnSpPr>
+                <p:cNvPr id="135" name="Connecteur droit avec flèche 134"/>
+                <p:cNvCxnSpPr/>
+                <p:nvPr/>
+              </p:nvCxnSpPr>
+              <p:spPr>
+                <a:xfrm flipH="1">
+                  <a:off x="2027848" y="3048492"/>
+                  <a:ext cx="3361962" cy="1006812"/>
+                </a:xfrm>
+                <a:prstGeom prst="straightConnector1">
+                  <a:avLst/>
+                </a:prstGeom>
+                <a:ln>
+                  <a:solidFill>
+                    <a:srgbClr val="FF6600"/>
+                  </a:solidFill>
+                  <a:prstDash val="sysDash"/>
+                  <a:headEnd type="oval"/>
+                  <a:tailEnd type="stealth" w="lg" len="lg"/>
+                </a:ln>
+              </p:spPr>
+              <p:style>
+                <a:lnRef idx="2">
+                  <a:schemeClr val="accent1"/>
+                </a:lnRef>
+                <a:fillRef idx="0">
+                  <a:schemeClr val="accent1"/>
+                </a:fillRef>
+                <a:effectRef idx="1">
+                  <a:schemeClr val="accent1"/>
+                </a:effectRef>
+                <a:fontRef idx="minor">
+                  <a:schemeClr val="tx1"/>
+                </a:fontRef>
+              </p:style>
+            </p:cxnSp>
+            <p:sp>
+              <p:nvSpPr>
+                <p:cNvPr id="145" name="ZoneTexte 144"/>
+                <p:cNvSpPr txBox="1"/>
+                <p:nvPr/>
+              </p:nvSpPr>
+              <p:spPr>
+                <a:xfrm>
+                  <a:off x="2176914" y="3049343"/>
+                  <a:ext cx="1095531" cy="523220"/>
+                </a:xfrm>
+                <a:prstGeom prst="rect">
+                  <a:avLst/>
+                </a:prstGeom>
+                <a:noFill/>
+              </p:spPr>
+              <p:txBody>
+                <a:bodyPr wrap="square" rtlCol="0">
+                  <a:spAutoFit/>
+                </a:bodyPr>
+                <a:lstStyle/>
+                <a:p>
+                  <a:r>
+                    <a:rPr lang="fr-FR" sz="1400" dirty="0" err="1" smtClean="0">
+                      <a:solidFill>
+                        <a:srgbClr val="FF6600"/>
+                      </a:solidFill>
+                    </a:rPr>
+                    <a:t>External</a:t>
+                  </a:r>
+                  <a:r>
+                    <a:rPr lang="fr-FR" sz="1400" dirty="0" smtClean="0">
+                      <a:solidFill>
+                        <a:srgbClr val="FF6600"/>
+                      </a:solidFill>
+                    </a:rPr>
+                    <a:t> SW  Interfaces</a:t>
+                  </a:r>
+                  <a:endParaRPr lang="fr-FR" sz="1400" dirty="0">
+                    <a:solidFill>
+                      <a:srgbClr val="FF6600"/>
+                    </a:solidFill>
+                  </a:endParaRPr>
+                </a:p>
+              </p:txBody>
+            </p:sp>
+            <p:grpSp>
+              <p:nvGrpSpPr>
+                <p:cNvPr id="146" name="Grouper 145"/>
+                <p:cNvGrpSpPr/>
+                <p:nvPr/>
+              </p:nvGrpSpPr>
+              <p:grpSpPr>
+                <a:xfrm>
+                  <a:off x="731873" y="5276864"/>
+                  <a:ext cx="2384613" cy="313592"/>
+                  <a:chOff x="6128170" y="-469158"/>
+                  <a:chExt cx="2384613" cy="313592"/>
+                </a:xfrm>
+              </p:grpSpPr>
+              <p:cxnSp>
+                <p:nvCxnSpPr>
+                  <p:cNvPr id="147" name="Connecteur droit avec flèche 146"/>
+                  <p:cNvCxnSpPr/>
+                  <p:nvPr/>
+                </p:nvCxnSpPr>
+                <p:spPr>
+                  <a:xfrm flipH="1" flipV="1">
+                    <a:off x="6404455" y="-469158"/>
+                    <a:ext cx="1642100" cy="5815"/>
+                  </a:xfrm>
+                  <a:prstGeom prst="straightConnector1">
+                    <a:avLst/>
+                  </a:prstGeom>
+                  <a:ln>
+                    <a:solidFill>
+                      <a:srgbClr val="FF6600"/>
+                    </a:solidFill>
+                    <a:prstDash val="sysDash"/>
+                    <a:headEnd type="oval"/>
+                    <a:tailEnd type="stealth" w="lg" len="lg"/>
+                  </a:ln>
+                </p:spPr>
+                <p:style>
+                  <a:lnRef idx="2">
+                    <a:schemeClr val="accent1"/>
+                  </a:lnRef>
+                  <a:fillRef idx="0">
+                    <a:schemeClr val="accent1"/>
+                  </a:fillRef>
+                  <a:effectRef idx="1">
+                    <a:schemeClr val="accent1"/>
+                  </a:effectRef>
+                  <a:fontRef idx="minor">
+                    <a:schemeClr val="tx1"/>
+                  </a:fontRef>
+                </p:style>
+              </p:cxnSp>
+              <p:sp>
+                <p:nvSpPr>
+                  <p:cNvPr id="148" name="ZoneTexte 147"/>
+                  <p:cNvSpPr txBox="1"/>
+                  <p:nvPr/>
+                </p:nvSpPr>
+                <p:spPr>
+                  <a:xfrm>
+                    <a:off x="6128170" y="-463343"/>
+                    <a:ext cx="2384613" cy="307777"/>
+                  </a:xfrm>
+                  <a:prstGeom prst="rect">
+                    <a:avLst/>
+                  </a:prstGeom>
+                  <a:noFill/>
+                </p:spPr>
+                <p:txBody>
+                  <a:bodyPr wrap="square" rtlCol="0">
+                    <a:spAutoFit/>
+                  </a:bodyPr>
+                  <a:lstStyle/>
+                  <a:p>
+                    <a:pPr algn="ctr"/>
+                    <a:r>
+                      <a:rPr lang="eu-ES" sz="1400" dirty="0" smtClean="0"/>
+                      <a:t>Deduce (create) requirements</a:t>
+                    </a:r>
+                    <a:endParaRPr lang="eu-ES" sz="1400" dirty="0"/>
+                  </a:p>
+                </p:txBody>
+              </p:sp>
+            </p:grpSp>
+            <p:cxnSp>
+              <p:nvCxnSpPr>
+                <p:cNvPr id="22" name="Connecteur droit avec flèche 21"/>
+                <p:cNvCxnSpPr/>
+                <p:nvPr/>
+              </p:nvCxnSpPr>
+              <p:spPr>
+                <a:xfrm>
+                  <a:off x="5243618" y="5268852"/>
+                  <a:ext cx="1535052" cy="0"/>
+                </a:xfrm>
+                <a:prstGeom prst="straightConnector1">
+                  <a:avLst/>
+                </a:prstGeom>
+                <a:ln>
+                  <a:solidFill>
+                    <a:srgbClr val="000000"/>
+                  </a:solidFill>
+                  <a:tailEnd type="arrow"/>
+                </a:ln>
+              </p:spPr>
+              <p:style>
+                <a:lnRef idx="2">
+                  <a:schemeClr val="accent1"/>
+                </a:lnRef>
+                <a:fillRef idx="0">
+                  <a:schemeClr val="accent1"/>
+                </a:fillRef>
+                <a:effectRef idx="1">
+                  <a:schemeClr val="accent1"/>
+                </a:effectRef>
+                <a:fontRef idx="minor">
+                  <a:schemeClr val="tx1"/>
+                </a:fontRef>
+              </p:style>
+            </p:cxnSp>
+            <p:cxnSp>
+              <p:nvCxnSpPr>
+                <p:cNvPr id="21" name="Connecteur droit avec flèche 20"/>
+                <p:cNvCxnSpPr/>
+                <p:nvPr/>
+              </p:nvCxnSpPr>
+              <p:spPr>
+                <a:xfrm>
+                  <a:off x="2243667" y="1735798"/>
+                  <a:ext cx="1134864" cy="534560"/>
+                </a:xfrm>
+                <a:prstGeom prst="straightConnector1">
+                  <a:avLst/>
+                </a:prstGeom>
+                <a:ln>
+                  <a:solidFill>
+                    <a:srgbClr val="000000"/>
+                  </a:solidFill>
+                  <a:tailEnd type="arrow"/>
+                </a:ln>
+              </p:spPr>
+              <p:style>
+                <a:lnRef idx="2">
+                  <a:schemeClr val="accent1"/>
+                </a:lnRef>
+                <a:fillRef idx="0">
+                  <a:schemeClr val="accent1"/>
+                </a:fillRef>
+                <a:effectRef idx="1">
+                  <a:schemeClr val="accent1"/>
+                </a:effectRef>
+                <a:fontRef idx="minor">
+                  <a:schemeClr val="tx1"/>
+                </a:fontRef>
+              </p:style>
+            </p:cxnSp>
+          </p:grpSp>
+        </p:grpSp>
+        <p:sp>
+          <p:nvSpPr>
+            <p:cNvPr id="36" name="ZoneTexte 35"/>
+            <p:cNvSpPr txBox="1"/>
+            <p:nvPr/>
+          </p:nvSpPr>
+          <p:spPr>
+            <a:xfrm>
+              <a:off x="1451429" y="2534919"/>
+              <a:ext cx="547429" cy="307777"/>
+            </a:xfrm>
+            <a:prstGeom prst="rect">
+              <a:avLst/>
+            </a:prstGeom>
+            <a:solidFill>
+              <a:srgbClr val="FF6600"/>
+            </a:solidFill>
+            <a:ln>
+              <a:solidFill>
+                <a:srgbClr val="8000FF"/>
+              </a:solidFill>
+            </a:ln>
+          </p:spPr>
+          <p:txBody>
+            <a:bodyPr wrap="square" rtlCol="0">
+              <a:spAutoFit/>
+            </a:bodyPr>
+            <a:lstStyle/>
+            <a:p>
+              <a:r>
+                <a:rPr lang="fr-FR" sz="700" dirty="0" smtClean="0"/>
+                <a:t>System IF </a:t>
+              </a:r>
+              <a:r>
+                <a:rPr lang="fr-FR" sz="700" dirty="0" err="1" smtClean="0"/>
+                <a:t>Req</a:t>
+              </a:r>
+              <a:r>
+                <a:rPr lang="fr-FR" sz="700" dirty="0" smtClean="0"/>
+                <a:t> 1</a:t>
+              </a:r>
+              <a:endParaRPr lang="fr-FR" sz="700" dirty="0"/>
+            </a:p>
+          </p:txBody>
+        </p:sp>
+        <p:sp>
+          <p:nvSpPr>
+            <p:cNvPr id="39" name="ZoneTexte 38"/>
+            <p:cNvSpPr txBox="1"/>
+            <p:nvPr/>
+          </p:nvSpPr>
+          <p:spPr>
+            <a:xfrm>
+              <a:off x="1566333" y="3648890"/>
+              <a:ext cx="432525" cy="307777"/>
+            </a:xfrm>
+            <a:prstGeom prst="rect">
+              <a:avLst/>
+            </a:prstGeom>
+            <a:solidFill>
+              <a:srgbClr val="FF6600"/>
+            </a:solidFill>
+            <a:ln>
+              <a:solidFill>
+                <a:srgbClr val="8000FF"/>
+              </a:solidFill>
+            </a:ln>
+          </p:spPr>
+          <p:txBody>
+            <a:bodyPr wrap="square" rtlCol="0">
+              <a:spAutoFit/>
+            </a:bodyPr>
+            <a:lstStyle/>
+            <a:p>
+              <a:r>
+                <a:rPr lang="fr-FR" sz="700" dirty="0" smtClean="0"/>
+                <a:t>SW IF </a:t>
+              </a:r>
+              <a:r>
+                <a:rPr lang="fr-FR" sz="700" dirty="0" err="1" smtClean="0"/>
+                <a:t>Req</a:t>
+              </a:r>
+              <a:r>
+                <a:rPr lang="fr-FR" sz="700" dirty="0" smtClean="0"/>
+                <a:t> 1</a:t>
+              </a:r>
+              <a:endParaRPr lang="fr-FR" sz="700" dirty="0"/>
+            </a:p>
+          </p:txBody>
+        </p:sp>
+        <p:sp>
+          <p:nvSpPr>
+            <p:cNvPr id="40" name="ZoneTexte 39"/>
+            <p:cNvSpPr txBox="1"/>
+            <p:nvPr/>
+          </p:nvSpPr>
+          <p:spPr>
+            <a:xfrm>
+              <a:off x="1693333" y="3928298"/>
+              <a:ext cx="457925" cy="307777"/>
+            </a:xfrm>
+            <a:prstGeom prst="rect">
+              <a:avLst/>
+            </a:prstGeom>
+            <a:solidFill>
+              <a:srgbClr val="FF6600"/>
+            </a:solidFill>
+            <a:ln>
+              <a:solidFill>
+                <a:srgbClr val="8000FF"/>
+              </a:solidFill>
+            </a:ln>
+          </p:spPr>
+          <p:txBody>
+            <a:bodyPr wrap="square" rtlCol="0">
+              <a:spAutoFit/>
+            </a:bodyPr>
+            <a:lstStyle/>
+            <a:p>
+              <a:r>
+                <a:rPr lang="fr-FR" sz="700" dirty="0" smtClean="0"/>
+                <a:t>SW IF</a:t>
+              </a:r>
+            </a:p>
+            <a:p>
+              <a:r>
+                <a:rPr lang="fr-FR" sz="700" dirty="0" smtClean="0"/>
+                <a:t> </a:t>
+              </a:r>
+              <a:r>
+                <a:rPr lang="fr-FR" sz="700" dirty="0" err="1" smtClean="0"/>
+                <a:t>Req</a:t>
+              </a:r>
+              <a:r>
+                <a:rPr lang="fr-FR" sz="700" dirty="0" smtClean="0"/>
+                <a:t> 2</a:t>
+              </a:r>
+              <a:endParaRPr lang="fr-FR" sz="700" dirty="0"/>
+            </a:p>
+          </p:txBody>
+        </p:sp>
+      </p:grpSp>
+      <p:sp>
+        <p:nvSpPr>
+          <p:cNvPr id="150" name="ZoneTexte 149"/>
+          <p:cNvSpPr txBox="1"/>
+          <p:nvPr/>
+        </p:nvSpPr>
+        <p:spPr>
+          <a:xfrm>
+            <a:off x="3116486" y="38504"/>
+            <a:ext cx="3641968" cy="369332"/>
+          </a:xfrm>
+          <a:prstGeom prst="rect">
+            <a:avLst/>
+          </a:prstGeom>
+          <a:noFill/>
+        </p:spPr>
+        <p:txBody>
+          <a:bodyPr wrap="none" rtlCol="0">
+            <a:spAutoFit/>
+          </a:bodyPr>
+          <a:lstStyle/>
+          <a:p>
+            <a:r>
+              <a:rPr lang="fr-FR" dirty="0" err="1" smtClean="0"/>
+              <a:t>requirement</a:t>
+            </a:r>
+            <a:r>
+              <a:rPr lang="fr-FR" dirty="0" smtClean="0"/>
+              <a:t> </a:t>
+            </a:r>
+            <a:r>
+              <a:rPr lang="fr-FR" dirty="0" err="1" smtClean="0"/>
+              <a:t>creation</a:t>
+            </a:r>
+            <a:r>
+              <a:rPr lang="fr-FR" dirty="0" smtClean="0"/>
+              <a:t> </a:t>
+            </a:r>
+            <a:r>
+              <a:rPr lang="fr-FR" dirty="0" err="1" smtClean="0"/>
+              <a:t>at</a:t>
+            </a:r>
+            <a:r>
+              <a:rPr lang="fr-FR" dirty="0" smtClean="0"/>
+              <a:t> system </a:t>
+            </a:r>
+            <a:r>
+              <a:rPr lang="fr-FR" dirty="0" err="1" smtClean="0"/>
+              <a:t>level</a:t>
+            </a:r>
+            <a:endParaRPr lang="fr-FR" dirty="0"/>
+          </a:p>
+        </p:txBody>
+      </p:sp>
+    </p:spTree>
+    <p:extLst>
+      <p:ext uri="{BB962C8B-B14F-4D97-AF65-F5344CB8AC3E}">
+        <p14:creationId xmlns:p14="http://schemas.microsoft.com/office/powerpoint/2010/main" val="673336731"/>
+      </p:ext>
+    </p:extLst>
+  </p:cSld>
+  <p:clrMapOvr>
+    <a:masterClrMapping/>
+  </p:clrMapOvr>
+</p:sld>
+</file>
+
 <file path=ppt/slides/slide4.xml><?xml version="1.0" encoding="utf-8"?>
 <p:sld xmlns:a="http://schemas.openxmlformats.org/drawingml/2006/main" xmlns:r="http://schemas.openxmlformats.org/officeDocument/2006/relationships" xmlns:p="http://schemas.openxmlformats.org/presentationml/2006/main">
   <p:cSld>
@@ -52979,6 +55407,987 @@
           <a:chExt cx="0" cy="0"/>
         </a:xfrm>
       </p:grpSpPr>
+      <p:grpSp>
+        <p:nvGrpSpPr>
+          <p:cNvPr id="9" name="Grouper 8"/>
+          <p:cNvGrpSpPr/>
+          <p:nvPr/>
+        </p:nvGrpSpPr>
+        <p:grpSpPr>
+          <a:xfrm>
+            <a:off x="393096" y="665238"/>
+            <a:ext cx="6706810" cy="4729238"/>
+            <a:chOff x="393096" y="666326"/>
+            <a:chExt cx="6706810" cy="4793056"/>
+          </a:xfrm>
+        </p:grpSpPr>
+        <p:grpSp>
+          <p:nvGrpSpPr>
+            <p:cNvPr id="4" name="Grouper 3"/>
+            <p:cNvGrpSpPr/>
+            <p:nvPr/>
+          </p:nvGrpSpPr>
+          <p:grpSpPr>
+            <a:xfrm>
+              <a:off x="393096" y="666326"/>
+              <a:ext cx="6706810" cy="4793056"/>
+              <a:chOff x="393096" y="666326"/>
+              <a:chExt cx="6706810" cy="4793056"/>
+            </a:xfrm>
+          </p:grpSpPr>
+          <p:sp>
+            <p:nvSpPr>
+              <p:cNvPr id="30" name="Cylindre 29"/>
+              <p:cNvSpPr/>
+              <p:nvPr/>
+            </p:nvSpPr>
+            <p:spPr>
+              <a:xfrm>
+                <a:off x="443372" y="2358571"/>
+                <a:ext cx="1800295" cy="2025953"/>
+              </a:xfrm>
+              <a:prstGeom prst="can">
+                <a:avLst>
+                  <a:gd name="adj" fmla="val 5994"/>
+                </a:avLst>
+              </a:prstGeom>
+              <a:gradFill flip="none" rotWithShape="1">
+                <a:gsLst>
+                  <a:gs pos="0">
+                    <a:srgbClr val="8000FF"/>
+                  </a:gs>
+                  <a:gs pos="100000">
+                    <a:srgbClr val="FF00FF"/>
+                  </a:gs>
+                </a:gsLst>
+                <a:lin ang="5400000" scaled="0"/>
+                <a:tileRect/>
+              </a:gradFill>
+              <a:ln>
+                <a:solidFill>
+                  <a:srgbClr val="000000"/>
+                </a:solidFill>
+              </a:ln>
+            </p:spPr>
+            <p:style>
+              <a:lnRef idx="1">
+                <a:schemeClr val="accent1"/>
+              </a:lnRef>
+              <a:fillRef idx="3">
+                <a:schemeClr val="accent1"/>
+              </a:fillRef>
+              <a:effectRef idx="2">
+                <a:schemeClr val="accent1"/>
+              </a:effectRef>
+              <a:fontRef idx="minor">
+                <a:schemeClr val="lt1"/>
+              </a:fontRef>
+            </p:style>
+            <p:txBody>
+              <a:bodyPr rtlCol="0" anchor="ctr"/>
+              <a:lstStyle/>
+              <a:p>
+                <a:pPr algn="ctr"/>
+                <a:endParaRPr lang="fr-FR" sz="1600" dirty="0" smtClean="0">
+                  <a:solidFill>
+                    <a:schemeClr val="bg1"/>
+                  </a:solidFill>
+                </a:endParaRPr>
+              </a:p>
+              <a:p>
+                <a:pPr algn="ctr"/>
+                <a:r>
+                  <a:rPr lang="fr-FR" sz="1400" dirty="0" err="1" smtClean="0">
+                    <a:solidFill>
+                      <a:schemeClr val="bg1"/>
+                    </a:solidFill>
+                  </a:rPr>
+                  <a:t>Additional</a:t>
+                </a:r>
+                <a:r>
+                  <a:rPr lang="fr-FR" sz="1400" dirty="0" smtClean="0">
+                    <a:solidFill>
+                      <a:schemeClr val="bg1"/>
+                    </a:solidFill>
+                  </a:rPr>
+                  <a:t> openETCS requirements</a:t>
+                </a:r>
+              </a:p>
+              <a:p>
+                <a:pPr algn="ctr"/>
+                <a:endParaRPr lang="fr-FR" sz="1400" dirty="0">
+                  <a:solidFill>
+                    <a:schemeClr val="bg1"/>
+                  </a:solidFill>
+                </a:endParaRPr>
+              </a:p>
+            </p:txBody>
+          </p:sp>
+          <p:sp>
+            <p:nvSpPr>
+              <p:cNvPr id="29" name="Cylindre 28"/>
+              <p:cNvSpPr/>
+              <p:nvPr/>
+            </p:nvSpPr>
+            <p:spPr>
+              <a:xfrm>
+                <a:off x="443372" y="1173905"/>
+                <a:ext cx="1800295" cy="1096454"/>
+              </a:xfrm>
+              <a:prstGeom prst="can">
+                <a:avLst>
+                  <a:gd name="adj" fmla="val 8009"/>
+                </a:avLst>
+              </a:prstGeom>
+              <a:gradFill flip="none" rotWithShape="1">
+                <a:gsLst>
+                  <a:gs pos="0">
+                    <a:srgbClr val="8000FF"/>
+                  </a:gs>
+                  <a:gs pos="100000">
+                    <a:srgbClr val="FF00FF"/>
+                  </a:gs>
+                </a:gsLst>
+                <a:lin ang="5400000" scaled="0"/>
+                <a:tileRect/>
+              </a:gradFill>
+              <a:ln>
+                <a:solidFill>
+                  <a:srgbClr val="000000"/>
+                </a:solidFill>
+              </a:ln>
+            </p:spPr>
+            <p:style>
+              <a:lnRef idx="1">
+                <a:schemeClr val="accent1"/>
+              </a:lnRef>
+              <a:fillRef idx="3">
+                <a:schemeClr val="accent1"/>
+              </a:fillRef>
+              <a:effectRef idx="2">
+                <a:schemeClr val="accent1"/>
+              </a:effectRef>
+              <a:fontRef idx="minor">
+                <a:schemeClr val="lt1"/>
+              </a:fontRef>
+            </p:style>
+            <p:txBody>
+              <a:bodyPr rtlCol="0" anchor="ctr"/>
+              <a:lstStyle/>
+              <a:p>
+                <a:pPr algn="ctr"/>
+                <a:r>
+                  <a:rPr lang="fr-FR" sz="1600" dirty="0" smtClean="0">
+                    <a:solidFill>
+                      <a:schemeClr val="bg1"/>
+                    </a:solidFill>
+                  </a:rPr>
+                  <a:t>SRS </a:t>
+                </a:r>
+                <a:r>
+                  <a:rPr lang="fr-FR" sz="1600" dirty="0" err="1" smtClean="0">
+                    <a:solidFill>
+                      <a:schemeClr val="bg1"/>
+                    </a:solidFill>
+                  </a:rPr>
+                  <a:t>Subset</a:t>
+                </a:r>
+                <a:r>
+                  <a:rPr lang="fr-FR" sz="1600" dirty="0" smtClean="0">
+                    <a:solidFill>
+                      <a:schemeClr val="bg1"/>
+                    </a:solidFill>
+                  </a:rPr>
+                  <a:t> 26 requirements</a:t>
+                </a:r>
+              </a:p>
+              <a:p>
+                <a:pPr algn="ctr"/>
+                <a:r>
+                  <a:rPr lang="fr-FR" sz="1600" dirty="0" smtClean="0">
+                    <a:solidFill>
+                      <a:schemeClr val="bg1"/>
+                    </a:solidFill>
+                  </a:rPr>
+                  <a:t>as .ReqIF files</a:t>
+                </a:r>
+                <a:endParaRPr lang="fr-FR" sz="1600" dirty="0">
+                  <a:solidFill>
+                    <a:schemeClr val="bg1"/>
+                  </a:solidFill>
+                </a:endParaRPr>
+              </a:p>
+            </p:txBody>
+          </p:sp>
+          <p:sp>
+            <p:nvSpPr>
+              <p:cNvPr id="23" name="ZoneTexte 22"/>
+              <p:cNvSpPr txBox="1"/>
+              <p:nvPr/>
+            </p:nvSpPr>
+            <p:spPr>
+              <a:xfrm>
+                <a:off x="569422" y="5041275"/>
+                <a:ext cx="2384613" cy="307777"/>
+              </a:xfrm>
+              <a:prstGeom prst="rect">
+                <a:avLst/>
+              </a:prstGeom>
+              <a:noFill/>
+            </p:spPr>
+            <p:txBody>
+              <a:bodyPr wrap="square" rtlCol="0">
+                <a:spAutoFit/>
+              </a:bodyPr>
+              <a:lstStyle/>
+              <a:p>
+                <a:pPr algn="ctr"/>
+                <a:r>
+                  <a:rPr lang="eu-ES" sz="1400" dirty="0" smtClean="0"/>
+                  <a:t>Requirement analysis</a:t>
+                </a:r>
+                <a:endParaRPr lang="eu-ES" sz="1400" dirty="0"/>
+              </a:p>
+            </p:txBody>
+          </p:sp>
+          <p:grpSp>
+            <p:nvGrpSpPr>
+              <p:cNvPr id="5" name="Grouper 4"/>
+              <p:cNvGrpSpPr/>
+              <p:nvPr/>
+            </p:nvGrpSpPr>
+            <p:grpSpPr>
+              <a:xfrm>
+                <a:off x="393096" y="666326"/>
+                <a:ext cx="6706810" cy="4793056"/>
+                <a:chOff x="393096" y="666326"/>
+                <a:chExt cx="6706810" cy="4793056"/>
+              </a:xfrm>
+            </p:grpSpPr>
+            <p:sp>
+              <p:nvSpPr>
+                <p:cNvPr id="68" name="Rectangle 67"/>
+                <p:cNvSpPr/>
+                <p:nvPr/>
+              </p:nvSpPr>
+              <p:spPr>
+                <a:xfrm>
+                  <a:off x="393096" y="666326"/>
+                  <a:ext cx="6706810" cy="4793056"/>
+                </a:xfrm>
+                <a:prstGeom prst="rect">
+                  <a:avLst/>
+                </a:prstGeom>
+                <a:solidFill>
+                  <a:schemeClr val="bg1">
+                    <a:lumMod val="85000"/>
+                    <a:alpha val="18000"/>
+                  </a:schemeClr>
+                </a:solidFill>
+                <a:ln>
+                  <a:solidFill>
+                    <a:schemeClr val="tx1"/>
+                  </a:solidFill>
+                </a:ln>
+              </p:spPr>
+              <p:style>
+                <a:lnRef idx="1">
+                  <a:schemeClr val="accent1"/>
+                </a:lnRef>
+                <a:fillRef idx="3">
+                  <a:schemeClr val="accent1"/>
+                </a:fillRef>
+                <a:effectRef idx="2">
+                  <a:schemeClr val="accent1"/>
+                </a:effectRef>
+                <a:fontRef idx="minor">
+                  <a:schemeClr val="lt1"/>
+                </a:fontRef>
+              </p:style>
+              <p:txBody>
+                <a:bodyPr rtlCol="0" anchor="ctr"/>
+                <a:lstStyle/>
+                <a:p>
+                  <a:pPr algn="ctr"/>
+                  <a:endParaRPr lang="fr-FR"/>
+                </a:p>
+              </p:txBody>
+            </p:sp>
+            <p:sp>
+              <p:nvSpPr>
+                <p:cNvPr id="11" name="Rectangle à coins arrondis 10"/>
+                <p:cNvSpPr/>
+                <p:nvPr/>
+              </p:nvSpPr>
+              <p:spPr>
+                <a:xfrm>
+                  <a:off x="3116486" y="1173904"/>
+                  <a:ext cx="3842239" cy="3831195"/>
+                </a:xfrm>
+                <a:prstGeom prst="roundRect">
+                  <a:avLst/>
+                </a:prstGeom>
+                <a:solidFill>
+                  <a:srgbClr val="3366FF"/>
+                </a:solidFill>
+              </p:spPr>
+              <p:style>
+                <a:lnRef idx="1">
+                  <a:schemeClr val="accent1"/>
+                </a:lnRef>
+                <a:fillRef idx="3">
+                  <a:schemeClr val="accent1"/>
+                </a:fillRef>
+                <a:effectRef idx="2">
+                  <a:schemeClr val="accent1"/>
+                </a:effectRef>
+                <a:fontRef idx="minor">
+                  <a:schemeClr val="lt1"/>
+                </a:fontRef>
+              </p:style>
+              <p:txBody>
+                <a:bodyPr rtlCol="0" anchor="ctr"/>
+                <a:lstStyle/>
+                <a:p>
+                  <a:pPr algn="ctr"/>
+                  <a:r>
+                    <a:rPr lang="eu-ES" sz="1600" dirty="0" smtClean="0"/>
+                    <a:t>OpenETCS architecture SysML model - system level definition</a:t>
+                  </a:r>
+                </a:p>
+                <a:p>
+                  <a:pPr algn="ctr"/>
+                  <a:endParaRPr lang="eu-ES" sz="1600" dirty="0"/>
+                </a:p>
+                <a:p>
+                  <a:pPr algn="ctr"/>
+                  <a:endParaRPr lang="eu-ES" sz="1600" dirty="0" smtClean="0"/>
+                </a:p>
+                <a:p>
+                  <a:pPr algn="ctr"/>
+                  <a:endParaRPr lang="eu-ES" sz="1600" dirty="0"/>
+                </a:p>
+                <a:p>
+                  <a:pPr algn="ctr"/>
+                  <a:endParaRPr lang="eu-ES" sz="1600" dirty="0" smtClean="0"/>
+                </a:p>
+                <a:p>
+                  <a:pPr algn="ctr"/>
+                  <a:endParaRPr lang="eu-ES" sz="1600" dirty="0"/>
+                </a:p>
+                <a:p>
+                  <a:pPr algn="ctr"/>
+                  <a:endParaRPr lang="eu-ES" sz="1600" dirty="0" smtClean="0"/>
+                </a:p>
+                <a:p>
+                  <a:pPr algn="ctr"/>
+                  <a:endParaRPr lang="eu-ES" sz="1600" dirty="0" smtClean="0"/>
+                </a:p>
+                <a:p>
+                  <a:pPr algn="ctr"/>
+                  <a:endParaRPr lang="eu-ES" sz="1600" dirty="0"/>
+                </a:p>
+                <a:p>
+                  <a:pPr algn="ctr"/>
+                  <a:endParaRPr lang="eu-ES" sz="1600" dirty="0" smtClean="0"/>
+                </a:p>
+                <a:p>
+                  <a:pPr algn="ctr"/>
+                  <a:endParaRPr lang="eu-ES" sz="1600" dirty="0"/>
+                </a:p>
+                <a:p>
+                  <a:pPr algn="ctr"/>
+                  <a:endParaRPr lang="eu-ES" sz="1600" dirty="0" smtClean="0"/>
+                </a:p>
+                <a:p>
+                  <a:pPr algn="ctr"/>
+                  <a:endParaRPr lang="eu-ES" sz="1600" dirty="0"/>
+                </a:p>
+                <a:p>
+                  <a:pPr algn="ctr"/>
+                  <a:endParaRPr lang="eu-ES" sz="1600" dirty="0"/>
+                </a:p>
+              </p:txBody>
+            </p:sp>
+            <p:sp>
+              <p:nvSpPr>
+                <p:cNvPr id="70" name="ZoneTexte 69"/>
+                <p:cNvSpPr txBox="1"/>
+                <p:nvPr/>
+              </p:nvSpPr>
+              <p:spPr>
+                <a:xfrm>
+                  <a:off x="448855" y="716081"/>
+                  <a:ext cx="2204960" cy="317071"/>
+                </a:xfrm>
+                <a:prstGeom prst="rect">
+                  <a:avLst/>
+                </a:prstGeom>
+                <a:noFill/>
+              </p:spPr>
+              <p:txBody>
+                <a:bodyPr wrap="none" rtlCol="0">
+                  <a:spAutoFit/>
+                </a:bodyPr>
+                <a:lstStyle/>
+                <a:p>
+                  <a:r>
+                    <a:rPr lang="fr-FR" sz="1100" i="1" dirty="0" smtClean="0"/>
+                    <a:t>OpenETCS </a:t>
+                  </a:r>
+                  <a:r>
+                    <a:rPr lang="fr-FR" sz="1100" i="1" dirty="0" err="1" smtClean="0"/>
+                    <a:t>product</a:t>
+                  </a:r>
+                  <a:r>
+                    <a:rPr lang="fr-FR" sz="1100" i="1" dirty="0" smtClean="0"/>
+                    <a:t> </a:t>
+                  </a:r>
+                  <a:r>
+                    <a:rPr lang="fr-FR" sz="1100" i="1" dirty="0" err="1" smtClean="0"/>
+                    <a:t>definition</a:t>
+                  </a:r>
+                  <a:endParaRPr lang="fr-FR" sz="1100" i="1" dirty="0"/>
+                </a:p>
+              </p:txBody>
+            </p:sp>
+            <p:pic>
+              <p:nvPicPr>
+                <p:cNvPr id="19" name="Image 18" descr="1stlevelarchitecture.PNG"/>
+                <p:cNvPicPr>
+                  <a:picLocks noChangeAspect="1"/>
+                </p:cNvPicPr>
+                <p:nvPr/>
+              </p:nvPicPr>
+              <p:blipFill>
+                <a:blip r:embed="rId2">
+                  <a:extLst>
+                    <a:ext uri="{28A0092B-C50C-407E-A947-70E740481C1C}">
+                      <a14:useLocalDpi xmlns:a14="http://schemas.microsoft.com/office/drawing/2010/main" val="0"/>
+                    </a:ext>
+                  </a:extLst>
+                </a:blip>
+                <a:stretch>
+                  <a:fillRect/>
+                </a:stretch>
+              </p:blipFill>
+              <p:spPr>
+                <a:xfrm>
+                  <a:off x="3378531" y="2003078"/>
+                  <a:ext cx="3400139" cy="2546884"/>
+                </a:xfrm>
+                <a:prstGeom prst="rect">
+                  <a:avLst/>
+                </a:prstGeom>
+              </p:spPr>
+            </p:pic>
+            <p:sp>
+              <p:nvSpPr>
+                <p:cNvPr id="102" name="ZoneTexte 101"/>
+                <p:cNvSpPr txBox="1"/>
+                <p:nvPr/>
+              </p:nvSpPr>
+              <p:spPr>
+                <a:xfrm>
+                  <a:off x="2154349" y="2051117"/>
+                  <a:ext cx="1095531" cy="738664"/>
+                </a:xfrm>
+                <a:prstGeom prst="rect">
+                  <a:avLst/>
+                </a:prstGeom>
+                <a:noFill/>
+              </p:spPr>
+              <p:txBody>
+                <a:bodyPr wrap="square" rtlCol="0">
+                  <a:spAutoFit/>
+                </a:bodyPr>
+                <a:lstStyle/>
+                <a:p>
+                  <a:pPr algn="ctr"/>
+                  <a:r>
+                    <a:rPr lang="fr-FR" sz="1400" dirty="0" err="1" smtClean="0">
+                      <a:solidFill>
+                        <a:srgbClr val="FF6600"/>
+                      </a:solidFill>
+                    </a:rPr>
+                    <a:t>External</a:t>
+                  </a:r>
+                  <a:r>
+                    <a:rPr lang="fr-FR" sz="1400" dirty="0" smtClean="0">
+                      <a:solidFill>
+                        <a:srgbClr val="FF6600"/>
+                      </a:solidFill>
+                    </a:rPr>
+                    <a:t> System Interfaces</a:t>
+                  </a:r>
+                  <a:endParaRPr lang="fr-FR" sz="1400" dirty="0">
+                    <a:solidFill>
+                      <a:srgbClr val="FF6600"/>
+                    </a:solidFill>
+                  </a:endParaRPr>
+                </a:p>
+              </p:txBody>
+            </p:sp>
+            <p:cxnSp>
+              <p:nvCxnSpPr>
+                <p:cNvPr id="137" name="Connecteur droit avec flèche 136"/>
+                <p:cNvCxnSpPr/>
+                <p:nvPr/>
+              </p:nvCxnSpPr>
+              <p:spPr>
+                <a:xfrm flipH="1">
+                  <a:off x="2013402" y="2742668"/>
+                  <a:ext cx="2095662" cy="0"/>
+                </a:xfrm>
+                <a:prstGeom prst="straightConnector1">
+                  <a:avLst/>
+                </a:prstGeom>
+                <a:ln>
+                  <a:solidFill>
+                    <a:srgbClr val="FF6600"/>
+                  </a:solidFill>
+                  <a:prstDash val="sysDash"/>
+                  <a:headEnd type="oval"/>
+                  <a:tailEnd type="stealth" w="lg" len="lg"/>
+                </a:ln>
+              </p:spPr>
+              <p:style>
+                <a:lnRef idx="2">
+                  <a:schemeClr val="accent1"/>
+                </a:lnRef>
+                <a:fillRef idx="0">
+                  <a:schemeClr val="accent1"/>
+                </a:fillRef>
+                <a:effectRef idx="1">
+                  <a:schemeClr val="accent1"/>
+                </a:effectRef>
+                <a:fontRef idx="minor">
+                  <a:schemeClr val="tx1"/>
+                </a:fontRef>
+              </p:style>
+            </p:cxnSp>
+            <p:cxnSp>
+              <p:nvCxnSpPr>
+                <p:cNvPr id="113" name="Connecteur droit avec flèche 112"/>
+                <p:cNvCxnSpPr/>
+                <p:nvPr/>
+              </p:nvCxnSpPr>
+              <p:spPr>
+                <a:xfrm flipH="1">
+                  <a:off x="2027848" y="2966775"/>
+                  <a:ext cx="2732262" cy="896436"/>
+                </a:xfrm>
+                <a:prstGeom prst="straightConnector1">
+                  <a:avLst/>
+                </a:prstGeom>
+                <a:ln>
+                  <a:solidFill>
+                    <a:srgbClr val="FF6600"/>
+                  </a:solidFill>
+                  <a:prstDash val="sysDash"/>
+                  <a:headEnd type="oval"/>
+                  <a:tailEnd type="stealth" w="lg" len="lg"/>
+                </a:ln>
+              </p:spPr>
+              <p:style>
+                <a:lnRef idx="2">
+                  <a:schemeClr val="accent1"/>
+                </a:lnRef>
+                <a:fillRef idx="0">
+                  <a:schemeClr val="accent1"/>
+                </a:fillRef>
+                <a:effectRef idx="1">
+                  <a:schemeClr val="accent1"/>
+                </a:effectRef>
+                <a:fontRef idx="minor">
+                  <a:schemeClr val="tx1"/>
+                </a:fontRef>
+              </p:style>
+            </p:cxnSp>
+            <p:cxnSp>
+              <p:nvCxnSpPr>
+                <p:cNvPr id="135" name="Connecteur droit avec flèche 134"/>
+                <p:cNvCxnSpPr/>
+                <p:nvPr/>
+              </p:nvCxnSpPr>
+              <p:spPr>
+                <a:xfrm flipH="1">
+                  <a:off x="2027848" y="3048492"/>
+                  <a:ext cx="3361962" cy="1006812"/>
+                </a:xfrm>
+                <a:prstGeom prst="straightConnector1">
+                  <a:avLst/>
+                </a:prstGeom>
+                <a:ln>
+                  <a:solidFill>
+                    <a:srgbClr val="FF6600"/>
+                  </a:solidFill>
+                  <a:prstDash val="sysDash"/>
+                  <a:headEnd type="oval"/>
+                  <a:tailEnd type="stealth" w="lg" len="lg"/>
+                </a:ln>
+              </p:spPr>
+              <p:style>
+                <a:lnRef idx="2">
+                  <a:schemeClr val="accent1"/>
+                </a:lnRef>
+                <a:fillRef idx="0">
+                  <a:schemeClr val="accent1"/>
+                </a:fillRef>
+                <a:effectRef idx="1">
+                  <a:schemeClr val="accent1"/>
+                </a:effectRef>
+                <a:fontRef idx="minor">
+                  <a:schemeClr val="tx1"/>
+                </a:fontRef>
+              </p:style>
+            </p:cxnSp>
+            <p:sp>
+              <p:nvSpPr>
+                <p:cNvPr id="145" name="ZoneTexte 144"/>
+                <p:cNvSpPr txBox="1"/>
+                <p:nvPr/>
+              </p:nvSpPr>
+              <p:spPr>
+                <a:xfrm>
+                  <a:off x="2176914" y="3049343"/>
+                  <a:ext cx="1095531" cy="523220"/>
+                </a:xfrm>
+                <a:prstGeom prst="rect">
+                  <a:avLst/>
+                </a:prstGeom>
+                <a:noFill/>
+              </p:spPr>
+              <p:txBody>
+                <a:bodyPr wrap="square" rtlCol="0">
+                  <a:spAutoFit/>
+                </a:bodyPr>
+                <a:lstStyle/>
+                <a:p>
+                  <a:r>
+                    <a:rPr lang="fr-FR" sz="1400" dirty="0" err="1" smtClean="0">
+                      <a:solidFill>
+                        <a:srgbClr val="FF6600"/>
+                      </a:solidFill>
+                    </a:rPr>
+                    <a:t>External</a:t>
+                  </a:r>
+                  <a:r>
+                    <a:rPr lang="fr-FR" sz="1400" dirty="0" smtClean="0">
+                      <a:solidFill>
+                        <a:srgbClr val="FF6600"/>
+                      </a:solidFill>
+                    </a:rPr>
+                    <a:t> SW  Interfaces</a:t>
+                  </a:r>
+                  <a:endParaRPr lang="fr-FR" sz="1400" dirty="0">
+                    <a:solidFill>
+                      <a:srgbClr val="FF6600"/>
+                    </a:solidFill>
+                  </a:endParaRPr>
+                </a:p>
+              </p:txBody>
+            </p:sp>
+            <p:grpSp>
+              <p:nvGrpSpPr>
+                <p:cNvPr id="146" name="Grouper 145"/>
+                <p:cNvGrpSpPr/>
+                <p:nvPr/>
+              </p:nvGrpSpPr>
+              <p:grpSpPr>
+                <a:xfrm>
+                  <a:off x="494750" y="4697322"/>
+                  <a:ext cx="2384613" cy="307777"/>
+                  <a:chOff x="5891047" y="-1048700"/>
+                  <a:chExt cx="2384613" cy="307777"/>
+                </a:xfrm>
+              </p:grpSpPr>
+              <p:cxnSp>
+                <p:nvCxnSpPr>
+                  <p:cNvPr id="147" name="Connecteur droit avec flèche 146"/>
+                  <p:cNvCxnSpPr/>
+                  <p:nvPr/>
+                </p:nvCxnSpPr>
+                <p:spPr>
+                  <a:xfrm flipH="1" flipV="1">
+                    <a:off x="6186741" y="-746738"/>
+                    <a:ext cx="1642100" cy="5815"/>
+                  </a:xfrm>
+                  <a:prstGeom prst="straightConnector1">
+                    <a:avLst/>
+                  </a:prstGeom>
+                  <a:ln>
+                    <a:solidFill>
+                      <a:srgbClr val="FF6600"/>
+                    </a:solidFill>
+                    <a:prstDash val="sysDash"/>
+                    <a:headEnd type="oval"/>
+                    <a:tailEnd type="stealth" w="lg" len="lg"/>
+                  </a:ln>
+                </p:spPr>
+                <p:style>
+                  <a:lnRef idx="2">
+                    <a:schemeClr val="accent1"/>
+                  </a:lnRef>
+                  <a:fillRef idx="0">
+                    <a:schemeClr val="accent1"/>
+                  </a:fillRef>
+                  <a:effectRef idx="1">
+                    <a:schemeClr val="accent1"/>
+                  </a:effectRef>
+                  <a:fontRef idx="minor">
+                    <a:schemeClr val="tx1"/>
+                  </a:fontRef>
+                </p:style>
+              </p:cxnSp>
+              <p:sp>
+                <p:nvSpPr>
+                  <p:cNvPr id="148" name="ZoneTexte 147"/>
+                  <p:cNvSpPr txBox="1"/>
+                  <p:nvPr/>
+                </p:nvSpPr>
+                <p:spPr>
+                  <a:xfrm>
+                    <a:off x="5891047" y="-1048700"/>
+                    <a:ext cx="2384613" cy="307777"/>
+                  </a:xfrm>
+                  <a:prstGeom prst="rect">
+                    <a:avLst/>
+                  </a:prstGeom>
+                  <a:noFill/>
+                </p:spPr>
+                <p:txBody>
+                  <a:bodyPr wrap="square" rtlCol="0">
+                    <a:spAutoFit/>
+                  </a:bodyPr>
+                  <a:lstStyle/>
+                  <a:p>
+                    <a:pPr algn="ctr"/>
+                    <a:r>
+                      <a:rPr lang="eu-ES" sz="1400" dirty="0" smtClean="0"/>
+                      <a:t>Deduce (create) requirements</a:t>
+                    </a:r>
+                    <a:endParaRPr lang="eu-ES" sz="1400" dirty="0"/>
+                  </a:p>
+                </p:txBody>
+              </p:sp>
+            </p:grpSp>
+            <p:cxnSp>
+              <p:nvCxnSpPr>
+                <p:cNvPr id="22" name="Connecteur droit avec flèche 21"/>
+                <p:cNvCxnSpPr/>
+                <p:nvPr/>
+              </p:nvCxnSpPr>
+              <p:spPr>
+                <a:xfrm>
+                  <a:off x="981637" y="5353873"/>
+                  <a:ext cx="1535052" cy="0"/>
+                </a:xfrm>
+                <a:prstGeom prst="straightConnector1">
+                  <a:avLst/>
+                </a:prstGeom>
+                <a:ln>
+                  <a:solidFill>
+                    <a:srgbClr val="000000"/>
+                  </a:solidFill>
+                  <a:tailEnd type="arrow"/>
+                </a:ln>
+              </p:spPr>
+              <p:style>
+                <a:lnRef idx="2">
+                  <a:schemeClr val="accent1"/>
+                </a:lnRef>
+                <a:fillRef idx="0">
+                  <a:schemeClr val="accent1"/>
+                </a:fillRef>
+                <a:effectRef idx="1">
+                  <a:schemeClr val="accent1"/>
+                </a:effectRef>
+                <a:fontRef idx="minor">
+                  <a:schemeClr val="tx1"/>
+                </a:fontRef>
+              </p:style>
+            </p:cxnSp>
+            <p:cxnSp>
+              <p:nvCxnSpPr>
+                <p:cNvPr id="21" name="Connecteur droit avec flèche 20"/>
+                <p:cNvCxnSpPr/>
+                <p:nvPr/>
+              </p:nvCxnSpPr>
+              <p:spPr>
+                <a:xfrm>
+                  <a:off x="2243667" y="1735798"/>
+                  <a:ext cx="1134864" cy="534560"/>
+                </a:xfrm>
+                <a:prstGeom prst="straightConnector1">
+                  <a:avLst/>
+                </a:prstGeom>
+                <a:ln>
+                  <a:solidFill>
+                    <a:srgbClr val="000000"/>
+                  </a:solidFill>
+                  <a:tailEnd type="arrow"/>
+                </a:ln>
+              </p:spPr>
+              <p:style>
+                <a:lnRef idx="2">
+                  <a:schemeClr val="accent1"/>
+                </a:lnRef>
+                <a:fillRef idx="0">
+                  <a:schemeClr val="accent1"/>
+                </a:fillRef>
+                <a:effectRef idx="1">
+                  <a:schemeClr val="accent1"/>
+                </a:effectRef>
+                <a:fontRef idx="minor">
+                  <a:schemeClr val="tx1"/>
+                </a:fontRef>
+              </p:style>
+            </p:cxnSp>
+          </p:grpSp>
+        </p:grpSp>
+        <p:sp>
+          <p:nvSpPr>
+            <p:cNvPr id="36" name="ZoneTexte 35"/>
+            <p:cNvSpPr txBox="1"/>
+            <p:nvPr/>
+          </p:nvSpPr>
+          <p:spPr>
+            <a:xfrm>
+              <a:off x="1451429" y="2534919"/>
+              <a:ext cx="547429" cy="307777"/>
+            </a:xfrm>
+            <a:prstGeom prst="rect">
+              <a:avLst/>
+            </a:prstGeom>
+            <a:solidFill>
+              <a:srgbClr val="FF6600"/>
+            </a:solidFill>
+            <a:ln>
+              <a:solidFill>
+                <a:srgbClr val="8000FF"/>
+              </a:solidFill>
+            </a:ln>
+          </p:spPr>
+          <p:txBody>
+            <a:bodyPr wrap="square" rtlCol="0">
+              <a:spAutoFit/>
+            </a:bodyPr>
+            <a:lstStyle/>
+            <a:p>
+              <a:r>
+                <a:rPr lang="fr-FR" sz="700" dirty="0" smtClean="0"/>
+                <a:t>System IF </a:t>
+              </a:r>
+              <a:r>
+                <a:rPr lang="fr-FR" sz="700" dirty="0" err="1" smtClean="0"/>
+                <a:t>Req</a:t>
+              </a:r>
+              <a:r>
+                <a:rPr lang="fr-FR" sz="700" dirty="0" smtClean="0"/>
+                <a:t> 1</a:t>
+              </a:r>
+              <a:endParaRPr lang="fr-FR" sz="700" dirty="0"/>
+            </a:p>
+          </p:txBody>
+        </p:sp>
+        <p:sp>
+          <p:nvSpPr>
+            <p:cNvPr id="39" name="ZoneTexte 38"/>
+            <p:cNvSpPr txBox="1"/>
+            <p:nvPr/>
+          </p:nvSpPr>
+          <p:spPr>
+            <a:xfrm>
+              <a:off x="1566333" y="3648890"/>
+              <a:ext cx="432525" cy="307777"/>
+            </a:xfrm>
+            <a:prstGeom prst="rect">
+              <a:avLst/>
+            </a:prstGeom>
+            <a:solidFill>
+              <a:srgbClr val="FF6600"/>
+            </a:solidFill>
+            <a:ln>
+              <a:solidFill>
+                <a:srgbClr val="8000FF"/>
+              </a:solidFill>
+            </a:ln>
+          </p:spPr>
+          <p:txBody>
+            <a:bodyPr wrap="square" rtlCol="0">
+              <a:spAutoFit/>
+            </a:bodyPr>
+            <a:lstStyle/>
+            <a:p>
+              <a:r>
+                <a:rPr lang="fr-FR" sz="700" dirty="0" smtClean="0"/>
+                <a:t>SW </a:t>
+              </a:r>
+              <a:r>
+                <a:rPr lang="fr-FR" sz="700" dirty="0" err="1" smtClean="0"/>
+                <a:t>Req</a:t>
+              </a:r>
+              <a:r>
+                <a:rPr lang="fr-FR" sz="700" dirty="0" smtClean="0"/>
+                <a:t> 1</a:t>
+              </a:r>
+              <a:endParaRPr lang="fr-FR" sz="700" dirty="0"/>
+            </a:p>
+          </p:txBody>
+        </p:sp>
+        <p:sp>
+          <p:nvSpPr>
+            <p:cNvPr id="40" name="ZoneTexte 39"/>
+            <p:cNvSpPr txBox="1"/>
+            <p:nvPr/>
+          </p:nvSpPr>
+          <p:spPr>
+            <a:xfrm>
+              <a:off x="1693333" y="3928298"/>
+              <a:ext cx="457925" cy="307777"/>
+            </a:xfrm>
+            <a:prstGeom prst="rect">
+              <a:avLst/>
+            </a:prstGeom>
+            <a:solidFill>
+              <a:srgbClr val="FF6600"/>
+            </a:solidFill>
+            <a:ln>
+              <a:solidFill>
+                <a:srgbClr val="8000FF"/>
+              </a:solidFill>
+            </a:ln>
+          </p:spPr>
+          <p:txBody>
+            <a:bodyPr wrap="square" rtlCol="0">
+              <a:spAutoFit/>
+            </a:bodyPr>
+            <a:lstStyle/>
+            <a:p>
+              <a:r>
+                <a:rPr lang="fr-FR" sz="700" dirty="0" smtClean="0"/>
+                <a:t>SW</a:t>
+              </a:r>
+            </a:p>
+            <a:p>
+              <a:r>
+                <a:rPr lang="fr-FR" sz="700" dirty="0" smtClean="0"/>
+                <a:t> </a:t>
+              </a:r>
+              <a:r>
+                <a:rPr lang="fr-FR" sz="700" dirty="0" err="1" smtClean="0"/>
+                <a:t>Req</a:t>
+              </a:r>
+              <a:r>
+                <a:rPr lang="fr-FR" sz="700" dirty="0" smtClean="0"/>
+                <a:t> 2</a:t>
+              </a:r>
+              <a:endParaRPr lang="fr-FR" sz="700" dirty="0"/>
+            </a:p>
+          </p:txBody>
+        </p:sp>
+      </p:grpSp>
       <p:sp>
         <p:nvSpPr>
           <p:cNvPr id="150" name="ZoneTexte 149"/>
@@ -53033,1187 +56442,6 @@
           </a:p>
         </p:txBody>
       </p:sp>
-      <p:sp>
-        <p:nvSpPr>
-          <p:cNvPr id="23" name="ZoneTexte 22"/>
-          <p:cNvSpPr txBox="1"/>
-          <p:nvPr/>
-        </p:nvSpPr>
-        <p:spPr>
-          <a:xfrm>
-            <a:off x="5776842" y="6309043"/>
-            <a:ext cx="2384613" cy="307777"/>
-          </a:xfrm>
-          <a:prstGeom prst="rect">
-            <a:avLst/>
-          </a:prstGeom>
-          <a:noFill/>
-        </p:spPr>
-        <p:txBody>
-          <a:bodyPr wrap="square" rtlCol="0">
-            <a:spAutoFit/>
-          </a:bodyPr>
-          <a:lstStyle/>
-          <a:p>
-            <a:pPr algn="ctr"/>
-            <a:r>
-              <a:rPr lang="eu-ES" sz="1400" dirty="0" smtClean="0"/>
-              <a:t>Requirement analysis</a:t>
-            </a:r>
-            <a:endParaRPr lang="eu-ES" sz="1400" dirty="0"/>
-          </a:p>
-        </p:txBody>
-      </p:sp>
-      <p:grpSp>
-        <p:nvGrpSpPr>
-          <p:cNvPr id="5" name="Grouper 4"/>
-          <p:cNvGrpSpPr/>
-          <p:nvPr/>
-        </p:nvGrpSpPr>
-        <p:grpSpPr>
-          <a:xfrm>
-            <a:off x="347340" y="584603"/>
-            <a:ext cx="7582620" cy="6085332"/>
-            <a:chOff x="347340" y="584603"/>
-            <a:chExt cx="7582620" cy="6085332"/>
-          </a:xfrm>
-        </p:grpSpPr>
-        <p:sp>
-          <p:nvSpPr>
-            <p:cNvPr id="68" name="Rectangle 67"/>
-            <p:cNvSpPr/>
-            <p:nvPr/>
-          </p:nvSpPr>
-          <p:spPr>
-            <a:xfrm>
-              <a:off x="347340" y="584603"/>
-              <a:ext cx="7582620" cy="6085332"/>
-            </a:xfrm>
-            <a:prstGeom prst="rect">
-              <a:avLst/>
-            </a:prstGeom>
-            <a:solidFill>
-              <a:schemeClr val="bg1">
-                <a:lumMod val="85000"/>
-                <a:alpha val="18000"/>
-              </a:schemeClr>
-            </a:solidFill>
-            <a:ln>
-              <a:solidFill>
-                <a:schemeClr val="tx1"/>
-              </a:solidFill>
-            </a:ln>
-          </p:spPr>
-          <p:style>
-            <a:lnRef idx="1">
-              <a:schemeClr val="accent1"/>
-            </a:lnRef>
-            <a:fillRef idx="3">
-              <a:schemeClr val="accent1"/>
-            </a:fillRef>
-            <a:effectRef idx="2">
-              <a:schemeClr val="accent1"/>
-            </a:effectRef>
-            <a:fontRef idx="minor">
-              <a:schemeClr val="lt1"/>
-            </a:fontRef>
-          </p:style>
-          <p:txBody>
-            <a:bodyPr rtlCol="0" anchor="ctr"/>
-            <a:lstStyle/>
-            <a:p>
-              <a:pPr algn="ctr"/>
-              <a:endParaRPr lang="fr-FR"/>
-            </a:p>
-          </p:txBody>
-        </p:sp>
-        <p:sp>
-          <p:nvSpPr>
-            <p:cNvPr id="11" name="Rectangle à coins arrondis 10"/>
-            <p:cNvSpPr/>
-            <p:nvPr/>
-          </p:nvSpPr>
-          <p:spPr>
-            <a:xfrm>
-              <a:off x="3116486" y="1173904"/>
-              <a:ext cx="3842239" cy="3831195"/>
-            </a:xfrm>
-            <a:prstGeom prst="roundRect">
-              <a:avLst/>
-            </a:prstGeom>
-            <a:solidFill>
-              <a:srgbClr val="3366FF"/>
-            </a:solidFill>
-          </p:spPr>
-          <p:style>
-            <a:lnRef idx="1">
-              <a:schemeClr val="accent1"/>
-            </a:lnRef>
-            <a:fillRef idx="3">
-              <a:schemeClr val="accent1"/>
-            </a:fillRef>
-            <a:effectRef idx="2">
-              <a:schemeClr val="accent1"/>
-            </a:effectRef>
-            <a:fontRef idx="minor">
-              <a:schemeClr val="lt1"/>
-            </a:fontRef>
-          </p:style>
-          <p:txBody>
-            <a:bodyPr rtlCol="0" anchor="ctr"/>
-            <a:lstStyle/>
-            <a:p>
-              <a:pPr algn="ctr"/>
-              <a:r>
-                <a:rPr lang="eu-ES" sz="1600" dirty="0" smtClean="0"/>
-                <a:t>OpenETCS architecture SysML model - system level definition</a:t>
-              </a:r>
-            </a:p>
-            <a:p>
-              <a:pPr algn="ctr"/>
-              <a:endParaRPr lang="eu-ES" sz="1600" dirty="0"/>
-            </a:p>
-            <a:p>
-              <a:pPr algn="ctr"/>
-              <a:endParaRPr lang="eu-ES" sz="1600" dirty="0" smtClean="0"/>
-            </a:p>
-            <a:p>
-              <a:pPr algn="ctr"/>
-              <a:endParaRPr lang="eu-ES" sz="1600" dirty="0"/>
-            </a:p>
-            <a:p>
-              <a:pPr algn="ctr"/>
-              <a:endParaRPr lang="eu-ES" sz="1600" dirty="0" smtClean="0"/>
-            </a:p>
-            <a:p>
-              <a:pPr algn="ctr"/>
-              <a:endParaRPr lang="eu-ES" sz="1600" dirty="0"/>
-            </a:p>
-            <a:p>
-              <a:pPr algn="ctr"/>
-              <a:endParaRPr lang="eu-ES" sz="1600" dirty="0" smtClean="0"/>
-            </a:p>
-            <a:p>
-              <a:pPr algn="ctr"/>
-              <a:endParaRPr lang="eu-ES" sz="1600" dirty="0" smtClean="0"/>
-            </a:p>
-            <a:p>
-              <a:pPr algn="ctr"/>
-              <a:endParaRPr lang="eu-ES" sz="1600" dirty="0"/>
-            </a:p>
-            <a:p>
-              <a:pPr algn="ctr"/>
-              <a:endParaRPr lang="eu-ES" sz="1600" dirty="0" smtClean="0"/>
-            </a:p>
-            <a:p>
-              <a:pPr algn="ctr"/>
-              <a:endParaRPr lang="eu-ES" sz="1600" dirty="0"/>
-            </a:p>
-            <a:p>
-              <a:pPr algn="ctr"/>
-              <a:endParaRPr lang="eu-ES" sz="1600" dirty="0" smtClean="0"/>
-            </a:p>
-            <a:p>
-              <a:pPr algn="ctr"/>
-              <a:endParaRPr lang="eu-ES" sz="1600" dirty="0"/>
-            </a:p>
-            <a:p>
-              <a:pPr algn="ctr"/>
-              <a:endParaRPr lang="eu-ES" sz="1600" dirty="0"/>
-            </a:p>
-          </p:txBody>
-        </p:sp>
-        <p:sp>
-          <p:nvSpPr>
-            <p:cNvPr id="12" name="Cylindre 11"/>
-            <p:cNvSpPr/>
-            <p:nvPr/>
-          </p:nvSpPr>
-          <p:spPr>
-            <a:xfrm>
-              <a:off x="464604" y="1824887"/>
-              <a:ext cx="1563245" cy="1456310"/>
-            </a:xfrm>
-            <a:prstGeom prst="can">
-              <a:avLst>
-                <a:gd name="adj" fmla="val 16329"/>
-              </a:avLst>
-            </a:prstGeom>
-            <a:solidFill>
-              <a:srgbClr val="8000FF"/>
-            </a:solidFill>
-            <a:ln>
-              <a:solidFill>
-                <a:srgbClr val="000000"/>
-              </a:solidFill>
-            </a:ln>
-          </p:spPr>
-          <p:style>
-            <a:lnRef idx="1">
-              <a:schemeClr val="accent1"/>
-            </a:lnRef>
-            <a:fillRef idx="3">
-              <a:schemeClr val="accent1"/>
-            </a:fillRef>
-            <a:effectRef idx="2">
-              <a:schemeClr val="accent1"/>
-            </a:effectRef>
-            <a:fontRef idx="minor">
-              <a:schemeClr val="lt1"/>
-            </a:fontRef>
-          </p:style>
-          <p:txBody>
-            <a:bodyPr rtlCol="0" anchor="ctr"/>
-            <a:lstStyle/>
-            <a:p>
-              <a:pPr algn="ctr"/>
-              <a:r>
-                <a:rPr lang="fr-FR" sz="1600" dirty="0" smtClean="0">
-                  <a:solidFill>
-                    <a:schemeClr val="bg1"/>
-                  </a:solidFill>
-                </a:rPr>
-                <a:t>OpenETCS System requirements</a:t>
-              </a:r>
-              <a:endParaRPr lang="fr-FR" sz="1600" dirty="0">
-                <a:solidFill>
-                  <a:schemeClr val="bg1"/>
-                </a:solidFill>
-              </a:endParaRPr>
-            </a:p>
-            <a:p>
-              <a:pPr algn="ctr"/>
-              <a:endParaRPr lang="fr-FR" sz="1600" dirty="0" smtClean="0">
-                <a:solidFill>
-                  <a:schemeClr val="bg1"/>
-                </a:solidFill>
-              </a:endParaRPr>
-            </a:p>
-          </p:txBody>
-        </p:sp>
-        <p:sp>
-          <p:nvSpPr>
-            <p:cNvPr id="70" name="ZoneTexte 69"/>
-            <p:cNvSpPr txBox="1"/>
-            <p:nvPr/>
-          </p:nvSpPr>
-          <p:spPr>
-            <a:xfrm>
-              <a:off x="5676190" y="605755"/>
-              <a:ext cx="2204960" cy="317071"/>
-            </a:xfrm>
-            <a:prstGeom prst="rect">
-              <a:avLst/>
-            </a:prstGeom>
-            <a:noFill/>
-          </p:spPr>
-          <p:txBody>
-            <a:bodyPr wrap="none" rtlCol="0">
-              <a:spAutoFit/>
-            </a:bodyPr>
-            <a:lstStyle/>
-            <a:p>
-              <a:r>
-                <a:rPr lang="fr-FR" sz="1100" i="1" dirty="0" smtClean="0"/>
-                <a:t>OpenETCS </a:t>
-              </a:r>
-              <a:r>
-                <a:rPr lang="fr-FR" sz="1100" i="1" dirty="0" err="1" smtClean="0"/>
-                <a:t>product</a:t>
-              </a:r>
-              <a:r>
-                <a:rPr lang="fr-FR" sz="1100" i="1" dirty="0" smtClean="0"/>
-                <a:t> </a:t>
-              </a:r>
-              <a:r>
-                <a:rPr lang="fr-FR" sz="1100" i="1" dirty="0" err="1" smtClean="0"/>
-                <a:t>definition</a:t>
-              </a:r>
-              <a:endParaRPr lang="fr-FR" sz="1100" i="1" dirty="0"/>
-            </a:p>
-          </p:txBody>
-        </p:sp>
-        <p:pic>
-          <p:nvPicPr>
-            <p:cNvPr id="19" name="Image 18" descr="1stlevelarchitecture.PNG"/>
-            <p:cNvPicPr>
-              <a:picLocks noChangeAspect="1"/>
-            </p:cNvPicPr>
-            <p:nvPr/>
-          </p:nvPicPr>
-          <p:blipFill>
-            <a:blip r:embed="rId2">
-              <a:extLst>
-                <a:ext uri="{28A0092B-C50C-407E-A947-70E740481C1C}">
-                  <a14:useLocalDpi xmlns:a14="http://schemas.microsoft.com/office/drawing/2010/main" val="0"/>
-                </a:ext>
-              </a:extLst>
-            </a:blip>
-            <a:stretch>
-              <a:fillRect/>
-            </a:stretch>
-          </p:blipFill>
-          <p:spPr>
-            <a:xfrm>
-              <a:off x="3378531" y="2003078"/>
-              <a:ext cx="3400139" cy="2546884"/>
-            </a:xfrm>
-            <a:prstGeom prst="rect">
-              <a:avLst/>
-            </a:prstGeom>
-          </p:spPr>
-        </p:pic>
-        <p:sp>
-          <p:nvSpPr>
-            <p:cNvPr id="102" name="ZoneTexte 101"/>
-            <p:cNvSpPr txBox="1"/>
-            <p:nvPr/>
-          </p:nvSpPr>
-          <p:spPr>
-            <a:xfrm>
-              <a:off x="2134581" y="1996685"/>
-              <a:ext cx="1095531" cy="738664"/>
-            </a:xfrm>
-            <a:prstGeom prst="rect">
-              <a:avLst/>
-            </a:prstGeom>
-            <a:noFill/>
-          </p:spPr>
-          <p:txBody>
-            <a:bodyPr wrap="square" rtlCol="0">
-              <a:spAutoFit/>
-            </a:bodyPr>
-            <a:lstStyle/>
-            <a:p>
-              <a:r>
-                <a:rPr lang="fr-FR" sz="1400" dirty="0" err="1" smtClean="0">
-                  <a:solidFill>
-                    <a:srgbClr val="FF6600"/>
-                  </a:solidFill>
-                </a:rPr>
-                <a:t>External</a:t>
-              </a:r>
-              <a:r>
-                <a:rPr lang="fr-FR" sz="1400" dirty="0" smtClean="0">
-                  <a:solidFill>
-                    <a:srgbClr val="FF6600"/>
-                  </a:solidFill>
-                </a:rPr>
-                <a:t> System Interfaces</a:t>
-              </a:r>
-              <a:endParaRPr lang="fr-FR" sz="1400" dirty="0">
-                <a:solidFill>
-                  <a:srgbClr val="FF6600"/>
-                </a:solidFill>
-              </a:endParaRPr>
-            </a:p>
-          </p:txBody>
-        </p:sp>
-        <p:cxnSp>
-          <p:nvCxnSpPr>
-            <p:cNvPr id="137" name="Connecteur droit avec flèche 136"/>
-            <p:cNvCxnSpPr/>
-            <p:nvPr/>
-          </p:nvCxnSpPr>
-          <p:spPr>
-            <a:xfrm flipH="1">
-              <a:off x="2013402" y="2742668"/>
-              <a:ext cx="2095662" cy="0"/>
-            </a:xfrm>
-            <a:prstGeom prst="straightConnector1">
-              <a:avLst/>
-            </a:prstGeom>
-            <a:ln>
-              <a:solidFill>
-                <a:srgbClr val="FF6600"/>
-              </a:solidFill>
-              <a:prstDash val="sysDash"/>
-              <a:headEnd type="oval"/>
-              <a:tailEnd type="stealth" w="lg" len="lg"/>
-            </a:ln>
-          </p:spPr>
-          <p:style>
-            <a:lnRef idx="2">
-              <a:schemeClr val="accent1"/>
-            </a:lnRef>
-            <a:fillRef idx="0">
-              <a:schemeClr val="accent1"/>
-            </a:fillRef>
-            <a:effectRef idx="1">
-              <a:schemeClr val="accent1"/>
-            </a:effectRef>
-            <a:fontRef idx="minor">
-              <a:schemeClr val="tx1"/>
-            </a:fontRef>
-          </p:style>
-        </p:cxnSp>
-        <p:cxnSp>
-          <p:nvCxnSpPr>
-            <p:cNvPr id="110" name="Connecteur droit avec flèche 109"/>
-            <p:cNvCxnSpPr/>
-            <p:nvPr/>
-          </p:nvCxnSpPr>
-          <p:spPr>
-            <a:xfrm flipH="1">
-              <a:off x="2013402" y="2657292"/>
-              <a:ext cx="3376408" cy="309483"/>
-            </a:xfrm>
-            <a:prstGeom prst="straightConnector1">
-              <a:avLst/>
-            </a:prstGeom>
-            <a:ln>
-              <a:solidFill>
-                <a:srgbClr val="FF6600"/>
-              </a:solidFill>
-              <a:prstDash val="sysDash"/>
-              <a:headEnd type="oval"/>
-              <a:tailEnd type="stealth" w="lg" len="lg"/>
-            </a:ln>
-          </p:spPr>
-          <p:style>
-            <a:lnRef idx="2">
-              <a:schemeClr val="accent1"/>
-            </a:lnRef>
-            <a:fillRef idx="0">
-              <a:schemeClr val="accent1"/>
-            </a:fillRef>
-            <a:effectRef idx="1">
-              <a:schemeClr val="accent1"/>
-            </a:effectRef>
-            <a:fontRef idx="minor">
-              <a:schemeClr val="tx1"/>
-            </a:fontRef>
-          </p:style>
-        </p:cxnSp>
-        <p:cxnSp>
-          <p:nvCxnSpPr>
-            <p:cNvPr id="113" name="Connecteur droit avec flèche 112"/>
-            <p:cNvCxnSpPr/>
-            <p:nvPr/>
-          </p:nvCxnSpPr>
-          <p:spPr>
-            <a:xfrm flipH="1">
-              <a:off x="2027848" y="2966775"/>
-              <a:ext cx="2732262" cy="896436"/>
-            </a:xfrm>
-            <a:prstGeom prst="straightConnector1">
-              <a:avLst/>
-            </a:prstGeom>
-            <a:ln>
-              <a:solidFill>
-                <a:srgbClr val="FF6600"/>
-              </a:solidFill>
-              <a:prstDash val="sysDash"/>
-              <a:headEnd type="oval"/>
-              <a:tailEnd type="stealth" w="lg" len="lg"/>
-            </a:ln>
-          </p:spPr>
-          <p:style>
-            <a:lnRef idx="2">
-              <a:schemeClr val="accent1"/>
-            </a:lnRef>
-            <a:fillRef idx="0">
-              <a:schemeClr val="accent1"/>
-            </a:fillRef>
-            <a:effectRef idx="1">
-              <a:schemeClr val="accent1"/>
-            </a:effectRef>
-            <a:fontRef idx="minor">
-              <a:schemeClr val="tx1"/>
-            </a:fontRef>
-          </p:style>
-        </p:cxnSp>
-        <p:cxnSp>
-          <p:nvCxnSpPr>
-            <p:cNvPr id="135" name="Connecteur droit avec flèche 134"/>
-            <p:cNvCxnSpPr/>
-            <p:nvPr/>
-          </p:nvCxnSpPr>
-          <p:spPr>
-            <a:xfrm flipH="1">
-              <a:off x="2027848" y="3048492"/>
-              <a:ext cx="3361962" cy="1006812"/>
-            </a:xfrm>
-            <a:prstGeom prst="straightConnector1">
-              <a:avLst/>
-            </a:prstGeom>
-            <a:ln>
-              <a:solidFill>
-                <a:srgbClr val="FF6600"/>
-              </a:solidFill>
-              <a:prstDash val="sysDash"/>
-              <a:headEnd type="oval"/>
-              <a:tailEnd type="stealth" w="lg" len="lg"/>
-            </a:ln>
-          </p:spPr>
-          <p:style>
-            <a:lnRef idx="2">
-              <a:schemeClr val="accent1"/>
-            </a:lnRef>
-            <a:fillRef idx="0">
-              <a:schemeClr val="accent1"/>
-            </a:fillRef>
-            <a:effectRef idx="1">
-              <a:schemeClr val="accent1"/>
-            </a:effectRef>
-            <a:fontRef idx="minor">
-              <a:schemeClr val="tx1"/>
-            </a:fontRef>
-          </p:style>
-        </p:cxnSp>
-        <p:sp>
-          <p:nvSpPr>
-            <p:cNvPr id="145" name="ZoneTexte 144"/>
-            <p:cNvSpPr txBox="1"/>
-            <p:nvPr/>
-          </p:nvSpPr>
-          <p:spPr>
-            <a:xfrm>
-              <a:off x="1956524" y="3175851"/>
-              <a:ext cx="1095531" cy="523220"/>
-            </a:xfrm>
-            <a:prstGeom prst="rect">
-              <a:avLst/>
-            </a:prstGeom>
-            <a:noFill/>
-          </p:spPr>
-          <p:txBody>
-            <a:bodyPr wrap="square" rtlCol="0">
-              <a:spAutoFit/>
-            </a:bodyPr>
-            <a:lstStyle/>
-            <a:p>
-              <a:r>
-                <a:rPr lang="fr-FR" sz="1400" dirty="0" err="1" smtClean="0">
-                  <a:solidFill>
-                    <a:srgbClr val="FF6600"/>
-                  </a:solidFill>
-                </a:rPr>
-                <a:t>External</a:t>
-              </a:r>
-              <a:r>
-                <a:rPr lang="fr-FR" sz="1400" dirty="0" smtClean="0">
-                  <a:solidFill>
-                    <a:srgbClr val="FF6600"/>
-                  </a:solidFill>
-                </a:rPr>
-                <a:t> SW  Interfaces</a:t>
-              </a:r>
-              <a:endParaRPr lang="fr-FR" sz="1400" dirty="0">
-                <a:solidFill>
-                  <a:srgbClr val="FF6600"/>
-                </a:solidFill>
-              </a:endParaRPr>
-            </a:p>
-          </p:txBody>
-        </p:sp>
-        <p:grpSp>
-          <p:nvGrpSpPr>
-            <p:cNvPr id="146" name="Grouper 145"/>
-            <p:cNvGrpSpPr/>
-            <p:nvPr/>
-          </p:nvGrpSpPr>
-          <p:grpSpPr>
-            <a:xfrm>
-              <a:off x="993918" y="6166883"/>
-              <a:ext cx="2384613" cy="349407"/>
-              <a:chOff x="6390215" y="420861"/>
-              <a:chExt cx="2384613" cy="349407"/>
-            </a:xfrm>
-          </p:grpSpPr>
-          <p:cxnSp>
-            <p:nvCxnSpPr>
-              <p:cNvPr id="147" name="Connecteur droit avec flèche 146"/>
-              <p:cNvCxnSpPr/>
-              <p:nvPr/>
-            </p:nvCxnSpPr>
-            <p:spPr>
-              <a:xfrm flipH="1" flipV="1">
-                <a:off x="6737074" y="420861"/>
-                <a:ext cx="1642100" cy="5815"/>
-              </a:xfrm>
-              <a:prstGeom prst="straightConnector1">
-                <a:avLst/>
-              </a:prstGeom>
-              <a:ln>
-                <a:solidFill>
-                  <a:srgbClr val="FF6600"/>
-                </a:solidFill>
-                <a:prstDash val="sysDash"/>
-                <a:headEnd type="oval"/>
-                <a:tailEnd type="stealth" w="lg" len="lg"/>
-              </a:ln>
-            </p:spPr>
-            <p:style>
-              <a:lnRef idx="2">
-                <a:schemeClr val="accent1"/>
-              </a:lnRef>
-              <a:fillRef idx="0">
-                <a:schemeClr val="accent1"/>
-              </a:fillRef>
-              <a:effectRef idx="1">
-                <a:schemeClr val="accent1"/>
-              </a:effectRef>
-              <a:fontRef idx="minor">
-                <a:schemeClr val="tx1"/>
-              </a:fontRef>
-            </p:style>
-          </p:cxnSp>
-          <p:sp>
-            <p:nvSpPr>
-              <p:cNvPr id="148" name="ZoneTexte 147"/>
-              <p:cNvSpPr txBox="1"/>
-              <p:nvPr/>
-            </p:nvSpPr>
-            <p:spPr>
-              <a:xfrm>
-                <a:off x="6390215" y="462491"/>
-                <a:ext cx="2384613" cy="307777"/>
-              </a:xfrm>
-              <a:prstGeom prst="rect">
-                <a:avLst/>
-              </a:prstGeom>
-              <a:noFill/>
-            </p:spPr>
-            <p:txBody>
-              <a:bodyPr wrap="square" rtlCol="0">
-                <a:spAutoFit/>
-              </a:bodyPr>
-              <a:lstStyle/>
-              <a:p>
-                <a:pPr algn="ctr"/>
-                <a:r>
-                  <a:rPr lang="eu-ES" sz="1400" dirty="0" smtClean="0"/>
-                  <a:t>Deduce (create) requirements</a:t>
-                </a:r>
-                <a:endParaRPr lang="eu-ES" sz="1400" dirty="0"/>
-              </a:p>
-            </p:txBody>
-          </p:sp>
-        </p:grpSp>
-        <p:sp>
-          <p:nvSpPr>
-            <p:cNvPr id="20" name="Cylindre 19"/>
-            <p:cNvSpPr/>
-            <p:nvPr/>
-          </p:nvSpPr>
-          <p:spPr>
-            <a:xfrm>
-              <a:off x="464605" y="3437461"/>
-              <a:ext cx="1563244" cy="1164546"/>
-            </a:xfrm>
-            <a:prstGeom prst="can">
-              <a:avLst>
-                <a:gd name="adj" fmla="val 16329"/>
-              </a:avLst>
-            </a:prstGeom>
-            <a:solidFill>
-              <a:srgbClr val="FF00FF"/>
-            </a:solidFill>
-            <a:ln>
-              <a:solidFill>
-                <a:srgbClr val="000000"/>
-              </a:solidFill>
-            </a:ln>
-          </p:spPr>
-          <p:style>
-            <a:lnRef idx="1">
-              <a:schemeClr val="accent1"/>
-            </a:lnRef>
-            <a:fillRef idx="3">
-              <a:schemeClr val="accent1"/>
-            </a:fillRef>
-            <a:effectRef idx="2">
-              <a:schemeClr val="accent1"/>
-            </a:effectRef>
-            <a:fontRef idx="minor">
-              <a:schemeClr val="lt1"/>
-            </a:fontRef>
-          </p:style>
-          <p:txBody>
-            <a:bodyPr rtlCol="0" anchor="ctr"/>
-            <a:lstStyle/>
-            <a:p>
-              <a:pPr algn="ctr"/>
-              <a:endParaRPr lang="fr-FR" sz="1600" dirty="0" smtClean="0">
-                <a:solidFill>
-                  <a:schemeClr val="bg1"/>
-                </a:solidFill>
-              </a:endParaRPr>
-            </a:p>
-            <a:p>
-              <a:pPr algn="ctr"/>
-              <a:endParaRPr lang="fr-FR" sz="1600" dirty="0">
-                <a:solidFill>
-                  <a:schemeClr val="bg1"/>
-                </a:solidFill>
-              </a:endParaRPr>
-            </a:p>
-            <a:p>
-              <a:pPr algn="ctr"/>
-              <a:endParaRPr lang="fr-FR" sz="1600" dirty="0" smtClean="0">
-                <a:solidFill>
-                  <a:schemeClr val="bg1"/>
-                </a:solidFill>
-              </a:endParaRPr>
-            </a:p>
-            <a:p>
-              <a:pPr algn="ctr"/>
-              <a:endParaRPr lang="fr-FR" sz="1600" dirty="0" smtClean="0">
-                <a:solidFill>
-                  <a:schemeClr val="bg1"/>
-                </a:solidFill>
-              </a:endParaRPr>
-            </a:p>
-            <a:p>
-              <a:pPr algn="ctr"/>
-              <a:endParaRPr lang="fr-FR" sz="1600" dirty="0">
-                <a:solidFill>
-                  <a:schemeClr val="bg1"/>
-                </a:solidFill>
-              </a:endParaRPr>
-            </a:p>
-            <a:p>
-              <a:pPr algn="ctr"/>
-              <a:endParaRPr lang="fr-FR" sz="1600" dirty="0" smtClean="0">
-                <a:solidFill>
-                  <a:schemeClr val="bg1"/>
-                </a:solidFill>
-              </a:endParaRPr>
-            </a:p>
-            <a:p>
-              <a:pPr algn="ctr"/>
-              <a:r>
-                <a:rPr lang="fr-FR" sz="1600" dirty="0" smtClean="0">
-                  <a:solidFill>
-                    <a:schemeClr val="bg1"/>
-                  </a:solidFill>
-                </a:rPr>
-                <a:t>OpenETCS Software</a:t>
-              </a:r>
-            </a:p>
-            <a:p>
-              <a:pPr algn="ctr"/>
-              <a:r>
-                <a:rPr lang="fr-FR" sz="1600" dirty="0" smtClean="0">
-                  <a:solidFill>
-                    <a:schemeClr val="bg1"/>
-                  </a:solidFill>
-                </a:rPr>
-                <a:t>Requirements</a:t>
-              </a:r>
-            </a:p>
-            <a:p>
-              <a:pPr algn="ctr"/>
-              <a:endParaRPr lang="fr-FR" sz="1600" dirty="0">
-                <a:solidFill>
-                  <a:schemeClr val="bg1"/>
-                </a:solidFill>
-              </a:endParaRPr>
-            </a:p>
-            <a:p>
-              <a:pPr algn="ctr"/>
-              <a:endParaRPr lang="fr-FR" sz="1600" dirty="0" smtClean="0">
-                <a:solidFill>
-                  <a:schemeClr val="bg1"/>
-                </a:solidFill>
-              </a:endParaRPr>
-            </a:p>
-            <a:p>
-              <a:pPr algn="ctr"/>
-              <a:endParaRPr lang="fr-FR" sz="1600" dirty="0">
-                <a:solidFill>
-                  <a:schemeClr val="bg1"/>
-                </a:solidFill>
-              </a:endParaRPr>
-            </a:p>
-            <a:p>
-              <a:pPr algn="ctr"/>
-              <a:endParaRPr lang="fr-FR" sz="1600" dirty="0" smtClean="0">
-                <a:solidFill>
-                  <a:schemeClr val="bg1"/>
-                </a:solidFill>
-              </a:endParaRPr>
-            </a:p>
-            <a:p>
-              <a:pPr algn="ctr"/>
-              <a:endParaRPr lang="fr-FR" sz="1600" dirty="0" smtClean="0">
-                <a:solidFill>
-                  <a:schemeClr val="bg1"/>
-                </a:solidFill>
-              </a:endParaRPr>
-            </a:p>
-            <a:p>
-              <a:pPr algn="ctr"/>
-              <a:endParaRPr lang="fr-FR" sz="1600" dirty="0">
-                <a:solidFill>
-                  <a:schemeClr val="bg1"/>
-                </a:solidFill>
-              </a:endParaRPr>
-            </a:p>
-          </p:txBody>
-        </p:sp>
-        <p:cxnSp>
-          <p:nvCxnSpPr>
-            <p:cNvPr id="21" name="Connecteur droit avec flèche 20"/>
-            <p:cNvCxnSpPr/>
-            <p:nvPr/>
-          </p:nvCxnSpPr>
-          <p:spPr>
-            <a:xfrm>
-              <a:off x="2027848" y="1551710"/>
-              <a:ext cx="1350683" cy="668036"/>
-            </a:xfrm>
-            <a:prstGeom prst="straightConnector1">
-              <a:avLst/>
-            </a:prstGeom>
-            <a:ln>
-              <a:solidFill>
-                <a:srgbClr val="000000"/>
-              </a:solidFill>
-              <a:tailEnd type="arrow"/>
-            </a:ln>
-          </p:spPr>
-          <p:style>
-            <a:lnRef idx="2">
-              <a:schemeClr val="accent1"/>
-            </a:lnRef>
-            <a:fillRef idx="0">
-              <a:schemeClr val="accent1"/>
-            </a:fillRef>
-            <a:effectRef idx="1">
-              <a:schemeClr val="accent1"/>
-            </a:effectRef>
-            <a:fontRef idx="minor">
-              <a:schemeClr val="tx1"/>
-            </a:fontRef>
-          </p:style>
-        </p:cxnSp>
-        <p:cxnSp>
-          <p:nvCxnSpPr>
-            <p:cNvPr id="22" name="Connecteur droit avec flèche 21"/>
-            <p:cNvCxnSpPr/>
-            <p:nvPr/>
-          </p:nvCxnSpPr>
-          <p:spPr>
-            <a:xfrm>
-              <a:off x="6170776" y="6266355"/>
-              <a:ext cx="1535052" cy="0"/>
-            </a:xfrm>
-            <a:prstGeom prst="straightConnector1">
-              <a:avLst/>
-            </a:prstGeom>
-            <a:ln>
-              <a:solidFill>
-                <a:srgbClr val="000000"/>
-              </a:solidFill>
-              <a:tailEnd type="arrow"/>
-            </a:ln>
-          </p:spPr>
-          <p:style>
-            <a:lnRef idx="2">
-              <a:schemeClr val="accent1"/>
-            </a:lnRef>
-            <a:fillRef idx="0">
-              <a:schemeClr val="accent1"/>
-            </a:fillRef>
-            <a:effectRef idx="1">
-              <a:schemeClr val="accent1"/>
-            </a:effectRef>
-            <a:fontRef idx="minor">
-              <a:schemeClr val="tx1"/>
-            </a:fontRef>
-          </p:style>
-        </p:cxnSp>
-        <p:sp>
-          <p:nvSpPr>
-            <p:cNvPr id="27" name="Cylindre 26"/>
-            <p:cNvSpPr/>
-            <p:nvPr/>
-          </p:nvSpPr>
-          <p:spPr>
-            <a:xfrm>
-              <a:off x="436664" y="725155"/>
-              <a:ext cx="1836660" cy="826555"/>
-            </a:xfrm>
-            <a:prstGeom prst="can">
-              <a:avLst>
-                <a:gd name="adj" fmla="val 16329"/>
-              </a:avLst>
-            </a:prstGeom>
-            <a:solidFill>
-              <a:srgbClr val="8000FF"/>
-            </a:solidFill>
-            <a:ln>
-              <a:solidFill>
-                <a:srgbClr val="000000"/>
-              </a:solidFill>
-            </a:ln>
-          </p:spPr>
-          <p:style>
-            <a:lnRef idx="1">
-              <a:schemeClr val="accent1"/>
-            </a:lnRef>
-            <a:fillRef idx="3">
-              <a:schemeClr val="accent1"/>
-            </a:fillRef>
-            <a:effectRef idx="2">
-              <a:schemeClr val="accent1"/>
-            </a:effectRef>
-            <a:fontRef idx="minor">
-              <a:schemeClr val="lt1"/>
-            </a:fontRef>
-          </p:style>
-          <p:txBody>
-            <a:bodyPr rtlCol="0" anchor="ctr"/>
-            <a:lstStyle/>
-            <a:p>
-              <a:pPr algn="ctr"/>
-              <a:r>
-                <a:rPr lang="fr-FR" sz="1400" dirty="0" smtClean="0">
-                  <a:solidFill>
-                    <a:schemeClr val="bg1"/>
-                  </a:solidFill>
-                </a:rPr>
-                <a:t>OpenETCS </a:t>
-              </a:r>
-              <a:r>
-                <a:rPr lang="fr-FR" sz="1400" dirty="0" err="1" smtClean="0">
-                  <a:solidFill>
-                    <a:schemeClr val="bg1"/>
-                  </a:solidFill>
-                </a:rPr>
-                <a:t>stakeholder</a:t>
-              </a:r>
-              <a:r>
-                <a:rPr lang="fr-FR" sz="1400" dirty="0" smtClean="0">
-                  <a:solidFill>
-                    <a:schemeClr val="bg1"/>
-                  </a:solidFill>
-                </a:rPr>
-                <a:t> </a:t>
-              </a:r>
-            </a:p>
-            <a:p>
-              <a:pPr algn="ctr"/>
-              <a:r>
-                <a:rPr lang="fr-FR" sz="1400" dirty="0" err="1" smtClean="0">
-                  <a:solidFill>
-                    <a:schemeClr val="bg1"/>
-                  </a:solidFill>
-                </a:rPr>
-                <a:t>reference</a:t>
-              </a:r>
-              <a:r>
-                <a:rPr lang="fr-FR" sz="1400" dirty="0" smtClean="0">
-                  <a:solidFill>
-                    <a:schemeClr val="bg1"/>
-                  </a:solidFill>
-                </a:rPr>
-                <a:t> (</a:t>
-              </a:r>
-              <a:r>
-                <a:rPr lang="fr-FR" sz="1400" dirty="0" err="1" smtClean="0">
-                  <a:solidFill>
-                    <a:schemeClr val="bg1"/>
-                  </a:solidFill>
-                </a:rPr>
-                <a:t>baselined</a:t>
-              </a:r>
-              <a:r>
-                <a:rPr lang="fr-FR" sz="1400" dirty="0" smtClean="0">
-                  <a:solidFill>
-                    <a:schemeClr val="bg1"/>
-                  </a:solidFill>
-                </a:rPr>
-                <a:t>) requirements</a:t>
-              </a:r>
-              <a:endParaRPr lang="fr-FR" sz="1400" dirty="0">
-                <a:solidFill>
-                  <a:schemeClr val="bg1"/>
-                </a:solidFill>
-              </a:endParaRPr>
-            </a:p>
-          </p:txBody>
-        </p:sp>
-        <p:cxnSp>
-          <p:nvCxnSpPr>
-            <p:cNvPr id="28" name="Connecteur droit avec flèche 27"/>
-            <p:cNvCxnSpPr>
-              <a:endCxn id="19" idx="1"/>
-            </p:cNvCxnSpPr>
-            <p:nvPr/>
-          </p:nvCxnSpPr>
-          <p:spPr>
-            <a:xfrm>
-              <a:off x="2027849" y="3146094"/>
-              <a:ext cx="1350682" cy="130426"/>
-            </a:xfrm>
-            <a:prstGeom prst="straightConnector1">
-              <a:avLst/>
-            </a:prstGeom>
-            <a:ln>
-              <a:solidFill>
-                <a:srgbClr val="000000"/>
-              </a:solidFill>
-              <a:tailEnd type="arrow"/>
-            </a:ln>
-          </p:spPr>
-          <p:style>
-            <a:lnRef idx="2">
-              <a:schemeClr val="accent1"/>
-            </a:lnRef>
-            <a:fillRef idx="0">
-              <a:schemeClr val="accent1"/>
-            </a:fillRef>
-            <a:effectRef idx="1">
-              <a:schemeClr val="accent1"/>
-            </a:effectRef>
-            <a:fontRef idx="minor">
-              <a:schemeClr val="tx1"/>
-            </a:fontRef>
-          </p:style>
-        </p:cxnSp>
-        <p:cxnSp>
-          <p:nvCxnSpPr>
-            <p:cNvPr id="31" name="Connecteur droit avec flèche 30"/>
-            <p:cNvCxnSpPr/>
-            <p:nvPr/>
-          </p:nvCxnSpPr>
-          <p:spPr>
-            <a:xfrm flipV="1">
-              <a:off x="1268408" y="3055457"/>
-              <a:ext cx="3525" cy="533517"/>
-            </a:xfrm>
-            <a:prstGeom prst="straightConnector1">
-              <a:avLst/>
-            </a:prstGeom>
-            <a:ln w="57150" cmpd="sng">
-              <a:solidFill>
-                <a:srgbClr val="FF0000"/>
-              </a:solidFill>
-              <a:tailEnd type="arrow"/>
-            </a:ln>
-          </p:spPr>
-          <p:style>
-            <a:lnRef idx="2">
-              <a:schemeClr val="accent1"/>
-            </a:lnRef>
-            <a:fillRef idx="0">
-              <a:schemeClr val="accent1"/>
-            </a:fillRef>
-            <a:effectRef idx="1">
-              <a:schemeClr val="accent1"/>
-            </a:effectRef>
-            <a:fontRef idx="minor">
-              <a:schemeClr val="tx1"/>
-            </a:fontRef>
-          </p:style>
-        </p:cxnSp>
-        <p:cxnSp>
-          <p:nvCxnSpPr>
-            <p:cNvPr id="32" name="Connecteur droit avec flèche 31"/>
-            <p:cNvCxnSpPr/>
-            <p:nvPr/>
-          </p:nvCxnSpPr>
-          <p:spPr>
-            <a:xfrm flipH="1">
-              <a:off x="4324611" y="6309042"/>
-              <a:ext cx="976304" cy="1"/>
-            </a:xfrm>
-            <a:prstGeom prst="straightConnector1">
-              <a:avLst/>
-            </a:prstGeom>
-            <a:ln w="57150" cmpd="sng">
-              <a:solidFill>
-                <a:srgbClr val="FF0000"/>
-              </a:solidFill>
-              <a:tailEnd type="arrow"/>
-            </a:ln>
-          </p:spPr>
-          <p:style>
-            <a:lnRef idx="2">
-              <a:schemeClr val="accent1"/>
-            </a:lnRef>
-            <a:fillRef idx="0">
-              <a:schemeClr val="accent1"/>
-            </a:fillRef>
-            <a:effectRef idx="1">
-              <a:schemeClr val="accent1"/>
-            </a:effectRef>
-            <a:fontRef idx="minor">
-              <a:schemeClr val="tx1"/>
-            </a:fontRef>
-          </p:style>
-        </p:cxnSp>
-        <p:sp>
-          <p:nvSpPr>
-            <p:cNvPr id="33" name="ZoneTexte 32"/>
-            <p:cNvSpPr txBox="1"/>
-            <p:nvPr/>
-          </p:nvSpPr>
-          <p:spPr>
-            <a:xfrm>
-              <a:off x="3627441" y="6362158"/>
-              <a:ext cx="2384613" cy="307777"/>
-            </a:xfrm>
-            <a:prstGeom prst="rect">
-              <a:avLst/>
-            </a:prstGeom>
-            <a:noFill/>
-          </p:spPr>
-          <p:txBody>
-            <a:bodyPr wrap="square" rtlCol="0">
-              <a:spAutoFit/>
-            </a:bodyPr>
-            <a:lstStyle/>
-            <a:p>
-              <a:pPr algn="ctr"/>
-              <a:r>
-                <a:rPr lang="eu-ES" sz="1400" dirty="0" smtClean="0"/>
-                <a:t>Trace</a:t>
-              </a:r>
-              <a:endParaRPr lang="eu-ES" sz="1400" dirty="0"/>
-            </a:p>
-          </p:txBody>
-        </p:sp>
-        <p:cxnSp>
-          <p:nvCxnSpPr>
-            <p:cNvPr id="34" name="Connecteur droit avec flèche 33"/>
-            <p:cNvCxnSpPr/>
-            <p:nvPr/>
-          </p:nvCxnSpPr>
-          <p:spPr>
-            <a:xfrm flipV="1">
-              <a:off x="1271933" y="1469561"/>
-              <a:ext cx="3525" cy="533517"/>
-            </a:xfrm>
-            <a:prstGeom prst="straightConnector1">
-              <a:avLst/>
-            </a:prstGeom>
-            <a:ln w="57150" cmpd="sng">
-              <a:solidFill>
-                <a:srgbClr val="FF0000"/>
-              </a:solidFill>
-              <a:tailEnd type="arrow"/>
-            </a:ln>
-          </p:spPr>
-          <p:style>
-            <a:lnRef idx="2">
-              <a:schemeClr val="accent1"/>
-            </a:lnRef>
-            <a:fillRef idx="0">
-              <a:schemeClr val="accent1"/>
-            </a:fillRef>
-            <a:effectRef idx="1">
-              <a:schemeClr val="accent1"/>
-            </a:effectRef>
-            <a:fontRef idx="minor">
-              <a:schemeClr val="tx1"/>
-            </a:fontRef>
-          </p:style>
-        </p:cxnSp>
-      </p:grpSp>
     </p:spTree>
     <p:extLst>
       <p:ext uri="{BB962C8B-B14F-4D97-AF65-F5344CB8AC3E}">

</xml_diff>